<commit_message>
Draft: Rename  (non-minimal) release to frozen  (#105)
* rename release->frozen

* fix issues with release->frozen rename

* fix typos in release readme

* Update build.bash - fix tag to frozen

* Update build.bash (reelase), fix name

* Update build.bash - add push reminder

* Update build.bash

* allow a list of file to be added to release images (needed for e.g. plugins)

* allow a list of file to be added to release images (needed for e.g. plugins)- cleanup

* Update Dockerfile

* Update Dockerfile

* Update build.bash

* Update Readme.md

* update readme
</commit_message>
<xml_diff>
--- a/doc/docker_development_image.pptx
+++ b/doc/docker_development_image.pptx
@@ -162,29 +162,7 @@
 <file path=ppt/revisionInfo.xml><?xml version="1.0" encoding="utf-8"?>
 <p1510:revInfo xmlns:a="http://schemas.openxmlformats.org/drawingml/2006/main" xmlns:r="http://schemas.openxmlformats.org/officeDocument/2006/relationships" xmlns:p1510="http://schemas.microsoft.com/office/powerpoint/2015/10/main">
   <p1510:revLst>
-    <p1510:client id="{02E9DDD2-7DD4-FB0B-F946-2723E5073C08}" v="3" dt="2020-07-07T12:12:56.668"/>
-    <p1510:client id="{098484E1-9D92-1A06-AD2D-54829D766E7D}" v="22" dt="2020-07-07T06:50:11.719"/>
-    <p1510:client id="{100C7402-84DC-491F-B4B4-71346EF8E70E}" v="19" dt="2020-07-29T06:15:48.361"/>
-    <p1510:client id="{1297C24C-29C2-4E67-9CCE-E9E55AA7602F}" v="23" dt="2020-07-03T08:57:58.924"/>
-    <p1510:client id="{1652A5E1-10BF-D07D-A1BC-52A3EC32A538}" v="12" dt="2020-09-08T14:37:41.779"/>
-    <p1510:client id="{1B2842CA-14A1-6192-08E0-A5061FF46C94}" v="62" dt="2020-07-07T06:47:42.909"/>
-    <p1510:client id="{1BFD7530-F0B3-CF6C-94B5-2CB87CA84E0D}" v="419" dt="2020-07-06T17:18:33.256"/>
-    <p1510:client id="{2FE7665E-4A3D-7294-89BA-468123105C29}" v="65" dt="2020-07-03T17:47:13.461"/>
-    <p1510:client id="{3F242DE5-140A-4CAE-BFE1-DAD9282AFFA2}" v="5" dt="2020-07-03T13:05:01.836"/>
-    <p1510:client id="{421721EF-A370-477C-5E1E-099E07DFE73B}" v="6" dt="2020-07-03T18:42:45.193"/>
-    <p1510:client id="{4289239F-F08E-94C5-8D60-B7CE0AFD5A22}" v="53" dt="2020-07-08T17:34:06.433"/>
-    <p1510:client id="{4500E5A6-1AA9-42EF-BE21-0B87B9D3DC38}" v="139" dt="2020-07-09T12:01:01.343"/>
-    <p1510:client id="{49FBE8C5-E75F-746C-9868-9AA81C84751A}" v="69" dt="2020-07-09T06:57:53.992"/>
-    <p1510:client id="{59CA904F-F88A-1392-05F1-1A990F4B6538}" v="1" dt="2020-09-08T14:30:49.934"/>
-    <p1510:client id="{7C1A98B6-3737-5D73-8436-B9363EE73BD4}" v="2603" dt="2020-07-29T15:24:39.148"/>
-    <p1510:client id="{906407FC-D3E3-447C-9E86-2DE3082393FE}" v="3" dt="2020-08-19T11:17:31.475"/>
-    <p1510:client id="{93D94235-670A-EFAF-D5F1-8A395130EDA8}" v="54" dt="2020-07-29T06:23:14.718"/>
-    <p1510:client id="{A46272E5-C911-4A76-95FC-78557F2EE8F9}" v="18" dt="2020-07-09T10:49:18.875"/>
-    <p1510:client id="{A9CC32E0-7019-DBD2-7611-7D3DA322D5B8}" v="72" dt="2020-07-03T14:43:09.224"/>
-    <p1510:client id="{B251F66F-6DB0-E464-B963-C1799EE52DC5}" v="1854" dt="2020-07-03T09:33:58.558"/>
-    <p1510:client id="{C99D0E24-9F54-02B2-4A29-29D867C61EFF}" v="22" dt="2020-07-07T06:48:22.987"/>
-    <p1510:client id="{D54C779B-295A-D29B-26F1-12CEBFFEEA65}" v="4" dt="2020-09-08T14:38:51.970"/>
-    <p1510:client id="{E7846C9E-0A50-446B-822B-FEEB44FD29F7}" v="7" dt="2020-07-09T11:50:01.455"/>
+    <p1510:client id="{73A0E4AB-3C96-9801-941B-1A26E083D536}" v="75" dt="2025-02-14T14:59:26.007"/>
   </p1510:revLst>
 </p1510:revInfo>
 </file>
@@ -1083,19 +1061,7 @@
             <a:rPr lang="en-US" dirty="0">
               <a:latin typeface="Calibri"/>
             </a:rPr>
-            <a:t>Build </a:t>
-          </a:r>
-          <a:r>
-            <a:rPr lang="en-US" dirty="0" err="1">
-              <a:latin typeface="Calibri"/>
-            </a:rPr>
-            <a:t>devel</a:t>
-          </a:r>
-          <a:r>
-            <a:rPr lang="en-US" dirty="0">
-              <a:latin typeface="Calibri"/>
-            </a:rPr>
-            <a:t> image using base image</a:t>
+            <a:t>Build devel image using base image</a:t>
           </a:r>
           <a:endParaRPr lang="en-US" dirty="0"/>
         </a:p>
@@ -1255,7 +1221,7 @@
             <a:rPr lang="en-US" dirty="0">
               <a:latin typeface="Calibri"/>
             </a:rPr>
-            <a:t>Release image </a:t>
+            <a:t>Frozen image </a:t>
           </a:r>
           <a:br>
             <a:rPr lang="en-US" dirty="0">
@@ -1589,6 +1555,60 @@
       <dgm:prSet/>
       <dgm:spPr/>
     </dgm:pt>
+    <dgm:pt modelId="{44F2CC2F-66EE-47AA-9B45-E8A17811939B}">
+      <dgm:prSet phldr="0"/>
+      <dgm:spPr/>
+      <dgm:t>
+        <a:bodyPr/>
+        <a:lstStyle/>
+        <a:p>
+          <a:pPr rtl="0"/>
+          <a:r>
+            <a:rPr lang="en-US" dirty="0">
+              <a:latin typeface="Calibri"/>
+              <a:ea typeface="Calibri"/>
+              <a:cs typeface="Calibri"/>
+            </a:rPr>
+            <a:t>Release image</a:t>
+          </a:r>
+        </a:p>
+      </dgm:t>
+    </dgm:pt>
+    <dgm:pt modelId="{355224DC-9AE8-42FE-9785-ED0CE1E191EA}" type="parTrans" cxnId="{807983CD-BC4A-4B25-A761-10A837A89CCF}">
+      <dgm:prSet/>
+      <dgm:spPr/>
+    </dgm:pt>
+    <dgm:pt modelId="{ECBE57DE-3588-4B02-9943-FFDAC85590C0}" type="sibTrans" cxnId="{807983CD-BC4A-4B25-A761-10A837A89CCF}">
+      <dgm:prSet/>
+      <dgm:spPr/>
+    </dgm:pt>
+    <dgm:pt modelId="{87B67BA1-1506-445E-929B-33BF1E5FC9A7}">
+      <dgm:prSet phldr="0"/>
+      <dgm:spPr/>
+      <dgm:t>
+        <a:bodyPr/>
+        <a:lstStyle/>
+        <a:p>
+          <a:pPr rtl="0"/>
+          <a:r>
+            <a:rPr lang="en-US" dirty="0">
+              <a:latin typeface="Calibri"/>
+              <a:ea typeface="Calibri"/>
+              <a:cs typeface="Calibri"/>
+            </a:rPr>
+            <a:t>Normal Docker Image</a:t>
+          </a:r>
+        </a:p>
+      </dgm:t>
+    </dgm:pt>
+    <dgm:pt modelId="{8AC26DF0-ABC9-486F-92F6-D6E966804B58}" type="parTrans" cxnId="{588F689A-F673-4158-9C53-C2AE0D21DACA}">
+      <dgm:prSet/>
+      <dgm:spPr/>
+    </dgm:pt>
+    <dgm:pt modelId="{25BE90E2-BD6F-4D7E-A20B-32F286FF01C3}" type="sibTrans" cxnId="{588F689A-F673-4158-9C53-C2AE0D21DACA}">
+      <dgm:prSet/>
+      <dgm:spPr/>
+    </dgm:pt>
     <dgm:pt modelId="{D4D17A9C-0DD6-4BD0-BA1C-DD1A279DAF7C}" type="pres">
       <dgm:prSet presAssocID="{70A6D40D-12F3-4188-9E4A-6EDFAA43E9C3}" presName="linearFlow" presStyleCnt="0">
         <dgm:presLayoutVars>
@@ -1604,7 +1624,7 @@
       <dgm:spPr/>
     </dgm:pt>
     <dgm:pt modelId="{665A29DD-DFC9-4D8E-83A4-D115B43341E7}" type="pres">
-      <dgm:prSet presAssocID="{097EADA6-D381-4C5F-9A08-6B2DB5068484}" presName="parentText" presStyleLbl="alignNode1" presStyleIdx="0" presStyleCnt="4">
+      <dgm:prSet presAssocID="{097EADA6-D381-4C5F-9A08-6B2DB5068484}" presName="parentText" presStyleLbl="alignNode1" presStyleIdx="0" presStyleCnt="5">
         <dgm:presLayoutVars>
           <dgm:chMax val="1"/>
           <dgm:bulletEnabled val="1"/>
@@ -1613,7 +1633,7 @@
       <dgm:spPr/>
     </dgm:pt>
     <dgm:pt modelId="{96D2911D-D462-4789-B42E-088034A81A84}" type="pres">
-      <dgm:prSet presAssocID="{097EADA6-D381-4C5F-9A08-6B2DB5068484}" presName="descendantText" presStyleLbl="alignAcc1" presStyleIdx="0" presStyleCnt="4">
+      <dgm:prSet presAssocID="{097EADA6-D381-4C5F-9A08-6B2DB5068484}" presName="descendantText" presStyleLbl="alignAcc1" presStyleIdx="0" presStyleCnt="5">
         <dgm:presLayoutVars>
           <dgm:bulletEnabled val="1"/>
         </dgm:presLayoutVars>
@@ -1629,7 +1649,7 @@
       <dgm:spPr/>
     </dgm:pt>
     <dgm:pt modelId="{739335CE-5151-47E1-A5BF-05995CBF9A82}" type="pres">
-      <dgm:prSet presAssocID="{425092CB-E21B-44C9-AFA3-EDE3E202D6F8}" presName="parentText" presStyleLbl="alignNode1" presStyleIdx="1" presStyleCnt="4">
+      <dgm:prSet presAssocID="{425092CB-E21B-44C9-AFA3-EDE3E202D6F8}" presName="parentText" presStyleLbl="alignNode1" presStyleIdx="1" presStyleCnt="5">
         <dgm:presLayoutVars>
           <dgm:chMax val="1"/>
           <dgm:bulletEnabled val="1"/>
@@ -1638,7 +1658,7 @@
       <dgm:spPr/>
     </dgm:pt>
     <dgm:pt modelId="{99242DD0-614D-4E07-9431-E93317E80917}" type="pres">
-      <dgm:prSet presAssocID="{425092CB-E21B-44C9-AFA3-EDE3E202D6F8}" presName="descendantText" presStyleLbl="alignAcc1" presStyleIdx="1" presStyleCnt="4">
+      <dgm:prSet presAssocID="{425092CB-E21B-44C9-AFA3-EDE3E202D6F8}" presName="descendantText" presStyleLbl="alignAcc1" presStyleIdx="1" presStyleCnt="5">
         <dgm:presLayoutVars>
           <dgm:bulletEnabled val="1"/>
         </dgm:presLayoutVars>
@@ -1654,7 +1674,7 @@
       <dgm:spPr/>
     </dgm:pt>
     <dgm:pt modelId="{A35FC70C-2E24-4E7D-9FD2-E63462CAFBFD}" type="pres">
-      <dgm:prSet presAssocID="{6264FB2B-0B61-4932-BC58-E3E7CBAC3A71}" presName="parentText" presStyleLbl="alignNode1" presStyleIdx="2" presStyleCnt="4">
+      <dgm:prSet presAssocID="{6264FB2B-0B61-4932-BC58-E3E7CBAC3A71}" presName="parentText" presStyleLbl="alignNode1" presStyleIdx="2" presStyleCnt="5">
         <dgm:presLayoutVars>
           <dgm:chMax val="1"/>
           <dgm:bulletEnabled val="1"/>
@@ -1663,7 +1683,7 @@
       <dgm:spPr/>
     </dgm:pt>
     <dgm:pt modelId="{2DB18D42-E372-45EA-B2B9-C806C9A37DB2}" type="pres">
-      <dgm:prSet presAssocID="{6264FB2B-0B61-4932-BC58-E3E7CBAC3A71}" presName="descendantText" presStyleLbl="alignAcc1" presStyleIdx="2" presStyleCnt="4">
+      <dgm:prSet presAssocID="{6264FB2B-0B61-4932-BC58-E3E7CBAC3A71}" presName="descendantText" presStyleLbl="alignAcc1" presStyleIdx="2" presStyleCnt="5">
         <dgm:presLayoutVars>
           <dgm:bulletEnabled val="1"/>
         </dgm:presLayoutVars>
@@ -1679,7 +1699,7 @@
       <dgm:spPr/>
     </dgm:pt>
     <dgm:pt modelId="{D8428D6A-1D3A-4335-A542-7F37016DEE6D}" type="pres">
-      <dgm:prSet presAssocID="{0BF10736-6077-4854-8D48-83AA443A3512}" presName="parentText" presStyleLbl="alignNode1" presStyleIdx="3" presStyleCnt="4">
+      <dgm:prSet presAssocID="{0BF10736-6077-4854-8D48-83AA443A3512}" presName="parentText" presStyleLbl="alignNode1" presStyleIdx="3" presStyleCnt="5">
         <dgm:presLayoutVars>
           <dgm:chMax val="1"/>
           <dgm:bulletEnabled val="1"/>
@@ -1688,7 +1708,32 @@
       <dgm:spPr/>
     </dgm:pt>
     <dgm:pt modelId="{3694CE9D-16E2-4DAE-AF2A-C516F3D0DDE8}" type="pres">
-      <dgm:prSet presAssocID="{0BF10736-6077-4854-8D48-83AA443A3512}" presName="descendantText" presStyleLbl="alignAcc1" presStyleIdx="3" presStyleCnt="4">
+      <dgm:prSet presAssocID="{0BF10736-6077-4854-8D48-83AA443A3512}" presName="descendantText" presStyleLbl="alignAcc1" presStyleIdx="3" presStyleCnt="5">
+        <dgm:presLayoutVars>
+          <dgm:bulletEnabled val="1"/>
+        </dgm:presLayoutVars>
+      </dgm:prSet>
+      <dgm:spPr/>
+    </dgm:pt>
+    <dgm:pt modelId="{CF60E43E-50D5-430C-9C11-342A7EEFBA22}" type="pres">
+      <dgm:prSet presAssocID="{7E5EA8C1-1EEA-441B-8686-DB441F6E8702}" presName="sp" presStyleCnt="0"/>
+      <dgm:spPr/>
+    </dgm:pt>
+    <dgm:pt modelId="{E4033BF1-CDB5-4735-9BD9-7AB450923AC8}" type="pres">
+      <dgm:prSet presAssocID="{44F2CC2F-66EE-47AA-9B45-E8A17811939B}" presName="composite" presStyleCnt="0"/>
+      <dgm:spPr/>
+    </dgm:pt>
+    <dgm:pt modelId="{0E923790-1D77-44C9-90CC-7E8738E8D1C4}" type="pres">
+      <dgm:prSet presAssocID="{44F2CC2F-66EE-47AA-9B45-E8A17811939B}" presName="parentText" presStyleLbl="alignNode1" presStyleIdx="4" presStyleCnt="5">
+        <dgm:presLayoutVars>
+          <dgm:chMax val="1"/>
+          <dgm:bulletEnabled val="1"/>
+        </dgm:presLayoutVars>
+      </dgm:prSet>
+      <dgm:spPr/>
+    </dgm:pt>
+    <dgm:pt modelId="{9D75B86D-0D2D-42BA-8BDE-FF89B90EA005}" type="pres">
+      <dgm:prSet presAssocID="{44F2CC2F-66EE-47AA-9B45-E8A17811939B}" presName="descendantText" presStyleLbl="alignAcc1" presStyleIdx="4" presStyleCnt="5">
         <dgm:presLayoutVars>
           <dgm:bulletEnabled val="1"/>
         </dgm:presLayoutVars>
@@ -1698,59 +1743,67 @@
   </dgm:ptLst>
   <dgm:cxnLst>
     <dgm:cxn modelId="{BE6DBC00-42B4-416D-B595-937052BDF5F7}" srcId="{70A6D40D-12F3-4188-9E4A-6EDFAA43E9C3}" destId="{6264FB2B-0B61-4932-BC58-E3E7CBAC3A71}" srcOrd="2" destOrd="0" parTransId="{46C7B690-DFA1-4076-9D07-2F6B49BDF3E8}" sibTransId="{569DBB05-F571-450F-AA47-9FA0C5694C91}"/>
-    <dgm:cxn modelId="{14535301-69E6-477A-9E11-D443611EECE3}" type="presOf" srcId="{D141646D-4EFB-4A17-B095-06A6674968C4}" destId="{99242DD0-614D-4E07-9431-E93317E80917}" srcOrd="0" destOrd="2" presId="urn:microsoft.com/office/officeart/2005/8/layout/chevron2"/>
-    <dgm:cxn modelId="{60C3AC02-6E6E-4D17-90C7-CE9A1C9FE2CA}" type="presOf" srcId="{6264FB2B-0B61-4932-BC58-E3E7CBAC3A71}" destId="{A35FC70C-2E24-4E7D-9FD2-E63462CAFBFD}" srcOrd="0" destOrd="0" presId="urn:microsoft.com/office/officeart/2005/8/layout/chevron2"/>
     <dgm:cxn modelId="{21F5DA02-F849-45B4-9002-5A8071D25894}" srcId="{097EADA6-D381-4C5F-9A08-6B2DB5068484}" destId="{C4989BAA-5116-4695-8769-620374A9A019}" srcOrd="1" destOrd="0" parTransId="{26585CC3-57ED-4C81-B575-0E7EF23FBC1F}" sibTransId="{C9753859-A192-4CD0-9842-7E2F3167A444}"/>
-    <dgm:cxn modelId="{DBBACD06-C51A-4B56-B7C9-E3F8A18C8147}" type="presOf" srcId="{3E40D739-DF4F-41D2-A1D7-700DF96AE2AD}" destId="{2DB18D42-E372-45EA-B2B9-C806C9A37DB2}" srcOrd="0" destOrd="2" presId="urn:microsoft.com/office/officeart/2005/8/layout/chevron2"/>
+    <dgm:cxn modelId="{4987B006-AE0B-416D-8467-6C7195D55C56}" type="presOf" srcId="{DB02E335-13B1-4C6E-AA37-FF7F3BF4CC29}" destId="{96D2911D-D462-4789-B42E-088034A81A84}" srcOrd="0" destOrd="0" presId="urn:microsoft.com/office/officeart/2005/8/layout/chevron2"/>
     <dgm:cxn modelId="{6FAED607-8AB6-4695-8B51-ECE7670DDCB8}" srcId="{6264FB2B-0B61-4932-BC58-E3E7CBAC3A71}" destId="{00454B8C-0511-42E6-9453-2B9A4FCD2ABF}" srcOrd="1" destOrd="0" parTransId="{D22845BA-BD4E-4B85-BE9B-6C15E5F48D77}" sibTransId="{2AB2D2B7-E661-4DA7-A554-7AC883081FE7}"/>
     <dgm:cxn modelId="{44863F08-1B81-4B71-9BAA-3A4B3685FA98}" srcId="{70A6D40D-12F3-4188-9E4A-6EDFAA43E9C3}" destId="{097EADA6-D381-4C5F-9A08-6B2DB5068484}" srcOrd="0" destOrd="0" parTransId="{1D59C304-7927-4722-8CBD-00ACBC89CF78}" sibTransId="{3382688B-4B4A-43C2-9789-83D497265C6B}"/>
-    <dgm:cxn modelId="{802B7809-CE58-47DE-A2D5-8B0E3F737313}" type="presOf" srcId="{E956A940-1278-4ADB-B095-D57752CF49F8}" destId="{99242DD0-614D-4E07-9431-E93317E80917}" srcOrd="0" destOrd="1" presId="urn:microsoft.com/office/officeart/2005/8/layout/chevron2"/>
-    <dgm:cxn modelId="{C28CD70C-13B5-4373-86ED-235709C31E0A}" type="presOf" srcId="{71988659-A7BB-4573-8C8D-36474C74C02C}" destId="{3694CE9D-16E2-4DAE-AF2A-C516F3D0DDE8}" srcOrd="0" destOrd="0" presId="urn:microsoft.com/office/officeart/2005/8/layout/chevron2"/>
+    <dgm:cxn modelId="{9DF42E0C-884D-4E2A-9829-21134926414D}" type="presOf" srcId="{097EADA6-D381-4C5F-9A08-6B2DB5068484}" destId="{665A29DD-DFC9-4D8E-83A4-D115B43341E7}" srcOrd="0" destOrd="0" presId="urn:microsoft.com/office/officeart/2005/8/layout/chevron2"/>
+    <dgm:cxn modelId="{3D36EF0E-2A88-47A6-ACD6-FCC007E18093}" type="presOf" srcId="{0BF10736-6077-4854-8D48-83AA443A3512}" destId="{D8428D6A-1D3A-4335-A542-7F37016DEE6D}" srcOrd="0" destOrd="0" presId="urn:microsoft.com/office/officeart/2005/8/layout/chevron2"/>
+    <dgm:cxn modelId="{59F34210-69C4-4699-81FE-D86ADCCFE0E3}" type="presOf" srcId="{A24E2374-3F16-40CD-B2A8-BDC4E024E7BF}" destId="{99242DD0-614D-4E07-9431-E93317E80917}" srcOrd="0" destOrd="4" presId="urn:microsoft.com/office/officeart/2005/8/layout/chevron2"/>
     <dgm:cxn modelId="{5DB32814-65A1-48A5-A65B-1D0D2F37E99B}" srcId="{097EADA6-D381-4C5F-9A08-6B2DB5068484}" destId="{DB02E335-13B1-4C6E-AA37-FF7F3BF4CC29}" srcOrd="0" destOrd="0" parTransId="{95766A11-2D9A-4172-9855-9F9CC6156F13}" sibTransId="{9F70FAAE-2989-4942-B3E0-74772CAB7782}"/>
     <dgm:cxn modelId="{968EA91C-31AD-4F1F-8BBF-50B0E124D545}" srcId="{6264FB2B-0B61-4932-BC58-E3E7CBAC3A71}" destId="{3E40D739-DF4F-41D2-A1D7-700DF96AE2AD}" srcOrd="2" destOrd="0" parTransId="{B3B0F238-1984-471A-8A32-1C9349B73F36}" sibTransId="{0D95B08F-CB74-4C6E-91AC-4E645AE653BF}"/>
-    <dgm:cxn modelId="{F2274727-10F7-41F3-B101-DD08D305E6F5}" type="presOf" srcId="{097EADA6-D381-4C5F-9A08-6B2DB5068484}" destId="{665A29DD-DFC9-4D8E-83A4-D115B43341E7}" srcOrd="0" destOrd="0" presId="urn:microsoft.com/office/officeart/2005/8/layout/chevron2"/>
+    <dgm:cxn modelId="{5F262B23-47B5-40E7-84F8-9F395F92D0CB}" type="presOf" srcId="{3E40D739-DF4F-41D2-A1D7-700DF96AE2AD}" destId="{2DB18D42-E372-45EA-B2B9-C806C9A37DB2}" srcOrd="0" destOrd="2" presId="urn:microsoft.com/office/officeart/2005/8/layout/chevron2"/>
     <dgm:cxn modelId="{4ABB5828-7FD6-4325-B245-C0A3B0773FEA}" srcId="{6264FB2B-0B61-4932-BC58-E3E7CBAC3A71}" destId="{710C46B4-C325-4A9F-8D4D-185CC391DC3D}" srcOrd="4" destOrd="0" parTransId="{E41E5E96-CD7C-447A-B8AD-216BA2F6E875}" sibTransId="{E7BF58C3-177E-4A84-807E-DA2FABBCFD08}"/>
-    <dgm:cxn modelId="{F3354D2B-2483-4202-A86F-8342CA000AA2}" type="presOf" srcId="{BD30D45C-6322-4ADB-BA77-7E7F4531AD64}" destId="{99242DD0-614D-4E07-9431-E93317E80917}" srcOrd="0" destOrd="0" presId="urn:microsoft.com/office/officeart/2005/8/layout/chevron2"/>
+    <dgm:cxn modelId="{D8979E30-D8E7-4521-8A7F-086AB02D7F19}" type="presOf" srcId="{633163B5-385A-47C5-9A32-A92EE558A241}" destId="{99242DD0-614D-4E07-9431-E93317E80917}" srcOrd="0" destOrd="3" presId="urn:microsoft.com/office/officeart/2005/8/layout/chevron2"/>
+    <dgm:cxn modelId="{69126B33-7AD6-4108-8901-ADC863AA8135}" type="presOf" srcId="{71988659-A7BB-4573-8C8D-36474C74C02C}" destId="{3694CE9D-16E2-4DAE-AF2A-C516F3D0DDE8}" srcOrd="0" destOrd="0" presId="urn:microsoft.com/office/officeart/2005/8/layout/chevron2"/>
     <dgm:cxn modelId="{973A793C-5689-4C82-B0E7-0C86353AF056}" srcId="{70A6D40D-12F3-4188-9E4A-6EDFAA43E9C3}" destId="{0BF10736-6077-4854-8D48-83AA443A3512}" srcOrd="3" destOrd="0" parTransId="{1177FD22-495F-4F53-A2BB-D9CB6A01F830}" sibTransId="{7E5EA8C1-1EEA-441B-8686-DB441F6E8702}"/>
-    <dgm:cxn modelId="{761AEA43-42AF-4D20-A5E5-1E274370283E}" type="presOf" srcId="{4AD71EAD-2C46-40F2-B4FF-50FBB6A11BA4}" destId="{2DB18D42-E372-45EA-B2B9-C806C9A37DB2}" srcOrd="0" destOrd="5" presId="urn:microsoft.com/office/officeart/2005/8/layout/chevron2"/>
+    <dgm:cxn modelId="{9C7D5E5B-53BB-443C-BBE1-7E6033ABFF96}" type="presOf" srcId="{C1142E65-39C5-432C-8D36-5B312412EFF9}" destId="{99242DD0-614D-4E07-9431-E93317E80917}" srcOrd="0" destOrd="5" presId="urn:microsoft.com/office/officeart/2005/8/layout/chevron2"/>
+    <dgm:cxn modelId="{30A5AF46-453C-4D0A-BF13-379E12C32568}" type="presOf" srcId="{E956A940-1278-4ADB-B095-D57752CF49F8}" destId="{99242DD0-614D-4E07-9431-E93317E80917}" srcOrd="0" destOrd="1" presId="urn:microsoft.com/office/officeart/2005/8/layout/chevron2"/>
+    <dgm:cxn modelId="{3933AB47-F159-4E7B-A764-3C87D7217394}" type="presOf" srcId="{4AD71EAD-2C46-40F2-B4FF-50FBB6A11BA4}" destId="{2DB18D42-E372-45EA-B2B9-C806C9A37DB2}" srcOrd="0" destOrd="5" presId="urn:microsoft.com/office/officeart/2005/8/layout/chevron2"/>
     <dgm:cxn modelId="{86E6AB67-71CE-436F-92D3-7C63625E2AF0}" srcId="{6264FB2B-0B61-4932-BC58-E3E7CBAC3A71}" destId="{FC249E82-E1AA-4751-A2C6-46C2F983DFCA}" srcOrd="0" destOrd="0" parTransId="{9B2ADDEC-7E27-48D1-93F0-87166CBBD065}" sibTransId="{81447128-98E7-44EB-80C0-A5C982825A08}"/>
-    <dgm:cxn modelId="{E642946A-72EC-4899-BB8A-3CEB04C47739}" type="presOf" srcId="{633163B5-385A-47C5-9A32-A92EE558A241}" destId="{99242DD0-614D-4E07-9431-E93317E80917}" srcOrd="0" destOrd="3" presId="urn:microsoft.com/office/officeart/2005/8/layout/chevron2"/>
+    <dgm:cxn modelId="{7AD43669-4A57-4CDD-8ACA-6B9C50884630}" type="presOf" srcId="{425092CB-E21B-44C9-AFA3-EDE3E202D6F8}" destId="{739335CE-5151-47E1-A5BF-05995CBF9A82}" srcOrd="0" destOrd="0" presId="urn:microsoft.com/office/officeart/2005/8/layout/chevron2"/>
     <dgm:cxn modelId="{ABE5766E-2077-48F4-BEDC-9BEF41BE6EF0}" srcId="{425092CB-E21B-44C9-AFA3-EDE3E202D6F8}" destId="{633163B5-385A-47C5-9A32-A92EE558A241}" srcOrd="2" destOrd="0" parTransId="{0F374C7A-3133-4C93-8874-41A2ECD2F9D5}" sibTransId="{668EF979-2CD4-4B6A-9B25-B0D55DC0A714}"/>
     <dgm:cxn modelId="{E1B7574F-BE10-477F-A1DC-87D5B707F19C}" srcId="{0BF10736-6077-4854-8D48-83AA443A3512}" destId="{71988659-A7BB-4573-8C8D-36474C74C02C}" srcOrd="0" destOrd="0" parTransId="{79B0D7D4-3C0E-433A-AFF5-A48E0BFD7ADB}" sibTransId="{836647FB-6AB0-4046-B569-53E1C913BE85}"/>
-    <dgm:cxn modelId="{F542CA70-9B68-4A93-AACF-DE9FDFADB390}" type="presOf" srcId="{A24E2374-3F16-40CD-B2A8-BDC4E024E7BF}" destId="{99242DD0-614D-4E07-9431-E93317E80917}" srcOrd="0" destOrd="4" presId="urn:microsoft.com/office/officeart/2005/8/layout/chevron2"/>
-    <dgm:cxn modelId="{C750D970-0A22-4736-85B9-4E8C6666D919}" type="presOf" srcId="{425092CB-E21B-44C9-AFA3-EDE3E202D6F8}" destId="{739335CE-5151-47E1-A5BF-05995CBF9A82}" srcOrd="0" destOrd="0" presId="urn:microsoft.com/office/officeart/2005/8/layout/chevron2"/>
+    <dgm:cxn modelId="{8F44997E-A4E7-4FAD-9183-58A72069D416}" type="presOf" srcId="{D141646D-4EFB-4A17-B095-06A6674968C4}" destId="{99242DD0-614D-4E07-9431-E93317E80917}" srcOrd="0" destOrd="2" presId="urn:microsoft.com/office/officeart/2005/8/layout/chevron2"/>
+    <dgm:cxn modelId="{55742B83-E8DC-465B-AB51-9433177F83CB}" type="presOf" srcId="{C4989BAA-5116-4695-8769-620374A9A019}" destId="{96D2911D-D462-4789-B42E-088034A81A84}" srcOrd="0" destOrd="1" presId="urn:microsoft.com/office/officeart/2005/8/layout/chevron2"/>
     <dgm:cxn modelId="{060DCA86-BC82-4F52-B134-70D061D1C37C}" srcId="{710C46B4-C325-4A9F-8D4D-185CC391DC3D}" destId="{4AD71EAD-2C46-40F2-B4FF-50FBB6A11BA4}" srcOrd="0" destOrd="0" parTransId="{5AF68ECC-9913-482E-A791-4D11B550DE8A}" sibTransId="{F2CEC4D5-705C-44A3-AB6E-9022A706ECA6}"/>
     <dgm:cxn modelId="{0146AF87-EC0A-4D97-AB2C-F33D677F60F8}" srcId="{425092CB-E21B-44C9-AFA3-EDE3E202D6F8}" destId="{C1142E65-39C5-432C-8D36-5B312412EFF9}" srcOrd="4" destOrd="0" parTransId="{4277DC4E-0706-4586-84DF-0F6D47C4FC8A}" sibTransId="{8DE8EEE4-EB62-449E-83FA-BA1561A7F555}"/>
     <dgm:cxn modelId="{8FF1CC94-0B28-4470-BF8F-A86E7A26A7F9}" srcId="{425092CB-E21B-44C9-AFA3-EDE3E202D6F8}" destId="{E956A940-1278-4ADB-B095-D57752CF49F8}" srcOrd="1" destOrd="0" parTransId="{CA237A51-ECDF-4EF7-9BF0-D8274E13AC74}" sibTransId="{E891A456-A086-4A6B-AC6B-CE9A1E5541F8}"/>
-    <dgm:cxn modelId="{A6E56897-B379-4E9B-BF14-89611DFFCD8C}" type="presOf" srcId="{FC249E82-E1AA-4751-A2C6-46C2F983DFCA}" destId="{2DB18D42-E372-45EA-B2B9-C806C9A37DB2}" srcOrd="0" destOrd="0" presId="urn:microsoft.com/office/officeart/2005/8/layout/chevron2"/>
-    <dgm:cxn modelId="{ADE915B1-D94A-4E32-B8D0-9BC820B9E7CC}" type="presOf" srcId="{DB02E335-13B1-4C6E-AA37-FF7F3BF4CC29}" destId="{96D2911D-D462-4789-B42E-088034A81A84}" srcOrd="0" destOrd="0" presId="urn:microsoft.com/office/officeart/2005/8/layout/chevron2"/>
-    <dgm:cxn modelId="{327911B2-DEF8-4D56-9808-525E5B67CE60}" type="presOf" srcId="{C1142E65-39C5-432C-8D36-5B312412EFF9}" destId="{99242DD0-614D-4E07-9431-E93317E80917}" srcOrd="0" destOrd="5" presId="urn:microsoft.com/office/officeart/2005/8/layout/chevron2"/>
+    <dgm:cxn modelId="{588F689A-F673-4158-9C53-C2AE0D21DACA}" srcId="{44F2CC2F-66EE-47AA-9B45-E8A17811939B}" destId="{87B67BA1-1506-445E-929B-33BF1E5FC9A7}" srcOrd="0" destOrd="0" parTransId="{8AC26DF0-ABC9-486F-92F6-D6E966804B58}" sibTransId="{25BE90E2-BD6F-4D7E-A20B-32F286FF01C3}"/>
+    <dgm:cxn modelId="{6085D89D-6FE9-4A65-A09F-FD452300B40A}" type="presOf" srcId="{87B67BA1-1506-445E-929B-33BF1E5FC9A7}" destId="{9D75B86D-0D2D-42BA-8BDE-FF89B90EA005}" srcOrd="0" destOrd="0" presId="urn:microsoft.com/office/officeart/2005/8/layout/chevron2"/>
+    <dgm:cxn modelId="{4817E79E-D381-4367-A237-538B34843690}" type="presOf" srcId="{6264FB2B-0B61-4932-BC58-E3E7CBAC3A71}" destId="{A35FC70C-2E24-4E7D-9FD2-E63462CAFBFD}" srcOrd="0" destOrd="0" presId="urn:microsoft.com/office/officeart/2005/8/layout/chevron2"/>
+    <dgm:cxn modelId="{3F8335A3-8555-472D-A78A-2D001D76D68B}" type="presOf" srcId="{44F2CC2F-66EE-47AA-9B45-E8A17811939B}" destId="{0E923790-1D77-44C9-90CC-7E8738E8D1C4}" srcOrd="0" destOrd="0" presId="urn:microsoft.com/office/officeart/2005/8/layout/chevron2"/>
+    <dgm:cxn modelId="{C5CCBAB9-CA23-4AFC-AB99-8FAC11BA674B}" type="presOf" srcId="{00454B8C-0511-42E6-9453-2B9A4FCD2ABF}" destId="{2DB18D42-E372-45EA-B2B9-C806C9A37DB2}" srcOrd="0" destOrd="1" presId="urn:microsoft.com/office/officeart/2005/8/layout/chevron2"/>
     <dgm:cxn modelId="{103377C0-3F0C-427F-82D1-2CFBB2E95184}" srcId="{70A6D40D-12F3-4188-9E4A-6EDFAA43E9C3}" destId="{425092CB-E21B-44C9-AFA3-EDE3E202D6F8}" srcOrd="1" destOrd="0" parTransId="{88B60D58-6B1A-4BAF-953E-3E0B6E86AB21}" sibTransId="{2217E291-D062-478B-BAD0-141A28E5AF1C}"/>
+    <dgm:cxn modelId="{37EC27CB-74F2-47CB-9375-C0C03CB85AF1}" type="presOf" srcId="{710C46B4-C325-4A9F-8D4D-185CC391DC3D}" destId="{2DB18D42-E372-45EA-B2B9-C806C9A37DB2}" srcOrd="0" destOrd="4" presId="urn:microsoft.com/office/officeart/2005/8/layout/chevron2"/>
+    <dgm:cxn modelId="{6BFDE7CB-E074-4BB4-9B7B-258031602D53}" type="presOf" srcId="{BD30D45C-6322-4ADB-BA77-7E7F4531AD64}" destId="{99242DD0-614D-4E07-9431-E93317E80917}" srcOrd="0" destOrd="0" presId="urn:microsoft.com/office/officeart/2005/8/layout/chevron2"/>
+    <dgm:cxn modelId="{807983CD-BC4A-4B25-A761-10A837A89CCF}" srcId="{70A6D40D-12F3-4188-9E4A-6EDFAA43E9C3}" destId="{44F2CC2F-66EE-47AA-9B45-E8A17811939B}" srcOrd="4" destOrd="0" parTransId="{355224DC-9AE8-42FE-9785-ED0CE1E191EA}" sibTransId="{ECBE57DE-3588-4B02-9943-FFDAC85590C0}"/>
     <dgm:cxn modelId="{C9DC5CCE-AF8D-40AB-94DC-CD84C2BA4643}" srcId="{425092CB-E21B-44C9-AFA3-EDE3E202D6F8}" destId="{BD30D45C-6322-4ADB-BA77-7E7F4531AD64}" srcOrd="0" destOrd="0" parTransId="{86E49043-FF6F-4269-9FD0-BFE9E248995D}" sibTransId="{C9B3F069-A3F3-419A-83B7-8EA7EB480469}"/>
     <dgm:cxn modelId="{3456B9D1-6035-4B32-A98B-A0CF6E74AF49}" srcId="{425092CB-E21B-44C9-AFA3-EDE3E202D6F8}" destId="{A24E2374-3F16-40CD-B2A8-BDC4E024E7BF}" srcOrd="3" destOrd="0" parTransId="{25089C4D-0848-4251-B576-E79E36366540}" sibTransId="{8D130E91-AA56-4479-B5C3-44698DD3ED36}"/>
-    <dgm:cxn modelId="{913112D2-9FD6-49F7-A72A-F74183B71B7E}" type="presOf" srcId="{C4989BAA-5116-4695-8769-620374A9A019}" destId="{96D2911D-D462-4789-B42E-088034A81A84}" srcOrd="0" destOrd="1" presId="urn:microsoft.com/office/officeart/2005/8/layout/chevron2"/>
+    <dgm:cxn modelId="{AC38A9D3-76EC-4E94-91F2-6A310CDE7440}" type="presOf" srcId="{DF7072F3-81FA-42FF-923F-DDCD813B3CC0}" destId="{2DB18D42-E372-45EA-B2B9-C806C9A37DB2}" srcOrd="0" destOrd="3" presId="urn:microsoft.com/office/officeart/2005/8/layout/chevron2"/>
     <dgm:cxn modelId="{89441BD4-453A-49D3-AABE-A4D55EF510E2}" srcId="{6264FB2B-0B61-4932-BC58-E3E7CBAC3A71}" destId="{DF7072F3-81FA-42FF-923F-DDCD813B3CC0}" srcOrd="3" destOrd="0" parTransId="{485647F1-56F2-4907-9F36-D55BE282101F}" sibTransId="{CD681F0A-4A54-4AB5-868F-52A8F698B48B}"/>
-    <dgm:cxn modelId="{672D57DC-2582-41BC-9344-A420D41E700D}" type="presOf" srcId="{710C46B4-C325-4A9F-8D4D-185CC391DC3D}" destId="{2DB18D42-E372-45EA-B2B9-C806C9A37DB2}" srcOrd="0" destOrd="4" presId="urn:microsoft.com/office/officeart/2005/8/layout/chevron2"/>
-    <dgm:cxn modelId="{D9A449E1-FB0F-46B5-8714-9474D70574E0}" type="presOf" srcId="{DF7072F3-81FA-42FF-923F-DDCD813B3CC0}" destId="{2DB18D42-E372-45EA-B2B9-C806C9A37DB2}" srcOrd="0" destOrd="3" presId="urn:microsoft.com/office/officeart/2005/8/layout/chevron2"/>
-    <dgm:cxn modelId="{6C4E44E7-4CA6-43B6-A16B-D68EB00A3F19}" type="presOf" srcId="{0BF10736-6077-4854-8D48-83AA443A3512}" destId="{D8428D6A-1D3A-4335-A542-7F37016DEE6D}" srcOrd="0" destOrd="0" presId="urn:microsoft.com/office/officeart/2005/8/layout/chevron2"/>
+    <dgm:cxn modelId="{1C4E6EE1-A905-4079-B0B7-9CC5F6F8BD5A}" type="presOf" srcId="{FC249E82-E1AA-4751-A2C6-46C2F983DFCA}" destId="{2DB18D42-E372-45EA-B2B9-C806C9A37DB2}" srcOrd="0" destOrd="0" presId="urn:microsoft.com/office/officeart/2005/8/layout/chevron2"/>
     <dgm:cxn modelId="{C541DDE8-744B-468E-B07F-A1A457BF9C7A}" srcId="{E956A940-1278-4ADB-B095-D57752CF49F8}" destId="{D141646D-4EFB-4A17-B095-06A6674968C4}" srcOrd="0" destOrd="0" parTransId="{550EAA9D-F4B7-4C8E-A370-BDA436BC2C24}" sibTransId="{72CD2CAA-93BC-41F0-92A6-EB61F3DEFB41}"/>
-    <dgm:cxn modelId="{DAC9F3EA-4923-4F3B-B817-EA57198ECCF9}" type="presOf" srcId="{00454B8C-0511-42E6-9453-2B9A4FCD2ABF}" destId="{2DB18D42-E372-45EA-B2B9-C806C9A37DB2}" srcOrd="0" destOrd="1" presId="urn:microsoft.com/office/officeart/2005/8/layout/chevron2"/>
     <dgm:cxn modelId="{57376CF9-3B3E-4736-9AE4-8D12B619B1D2}" type="presOf" srcId="{70A6D40D-12F3-4188-9E4A-6EDFAA43E9C3}" destId="{D4D17A9C-0DD6-4BD0-BA1C-DD1A279DAF7C}" srcOrd="0" destOrd="0" presId="urn:microsoft.com/office/officeart/2005/8/layout/chevron2"/>
-    <dgm:cxn modelId="{A23EBF4E-F069-46BB-B28B-3B7C0B3D2D98}" type="presParOf" srcId="{D4D17A9C-0DD6-4BD0-BA1C-DD1A279DAF7C}" destId="{33ECAA16-4700-4E45-AE42-712413333D7A}" srcOrd="0" destOrd="0" presId="urn:microsoft.com/office/officeart/2005/8/layout/chevron2"/>
-    <dgm:cxn modelId="{D56E5C11-B97B-4E0D-8D5A-B8C310199252}" type="presParOf" srcId="{33ECAA16-4700-4E45-AE42-712413333D7A}" destId="{665A29DD-DFC9-4D8E-83A4-D115B43341E7}" srcOrd="0" destOrd="0" presId="urn:microsoft.com/office/officeart/2005/8/layout/chevron2"/>
-    <dgm:cxn modelId="{4FA136C0-DD13-4E63-BC03-BA8D995507C4}" type="presParOf" srcId="{33ECAA16-4700-4E45-AE42-712413333D7A}" destId="{96D2911D-D462-4789-B42E-088034A81A84}" srcOrd="1" destOrd="0" presId="urn:microsoft.com/office/officeart/2005/8/layout/chevron2"/>
-    <dgm:cxn modelId="{45362502-6B8B-4659-8D51-90B0388BF0E6}" type="presParOf" srcId="{D4D17A9C-0DD6-4BD0-BA1C-DD1A279DAF7C}" destId="{CDD40CDC-DB60-4F80-8B04-B9FCC6FD3B10}" srcOrd="1" destOrd="0" presId="urn:microsoft.com/office/officeart/2005/8/layout/chevron2"/>
-    <dgm:cxn modelId="{1C26F9F7-D553-4616-8484-E424245AEDF0}" type="presParOf" srcId="{D4D17A9C-0DD6-4BD0-BA1C-DD1A279DAF7C}" destId="{A6E81614-BE47-4D5B-A25B-28EA45005495}" srcOrd="2" destOrd="0" presId="urn:microsoft.com/office/officeart/2005/8/layout/chevron2"/>
-    <dgm:cxn modelId="{4A1172BF-78FB-49ED-82E1-BDE2AA180403}" type="presParOf" srcId="{A6E81614-BE47-4D5B-A25B-28EA45005495}" destId="{739335CE-5151-47E1-A5BF-05995CBF9A82}" srcOrd="0" destOrd="0" presId="urn:microsoft.com/office/officeart/2005/8/layout/chevron2"/>
-    <dgm:cxn modelId="{5628E621-B0EE-4A09-A52B-BC2101822CA5}" type="presParOf" srcId="{A6E81614-BE47-4D5B-A25B-28EA45005495}" destId="{99242DD0-614D-4E07-9431-E93317E80917}" srcOrd="1" destOrd="0" presId="urn:microsoft.com/office/officeart/2005/8/layout/chevron2"/>
-    <dgm:cxn modelId="{654DC8B5-EA27-486F-A8CF-1180CDDDE543}" type="presParOf" srcId="{D4D17A9C-0DD6-4BD0-BA1C-DD1A279DAF7C}" destId="{16287E9C-9724-4785-8757-B3156FAB554B}" srcOrd="3" destOrd="0" presId="urn:microsoft.com/office/officeart/2005/8/layout/chevron2"/>
-    <dgm:cxn modelId="{3932C289-7167-43EE-8EF9-EB3B741036C4}" type="presParOf" srcId="{D4D17A9C-0DD6-4BD0-BA1C-DD1A279DAF7C}" destId="{5AA45857-0D38-47C9-A8BE-F116671FE843}" srcOrd="4" destOrd="0" presId="urn:microsoft.com/office/officeart/2005/8/layout/chevron2"/>
-    <dgm:cxn modelId="{D985EDA2-FE60-4A61-AE56-A1533F1A68B8}" type="presParOf" srcId="{5AA45857-0D38-47C9-A8BE-F116671FE843}" destId="{A35FC70C-2E24-4E7D-9FD2-E63462CAFBFD}" srcOrd="0" destOrd="0" presId="urn:microsoft.com/office/officeart/2005/8/layout/chevron2"/>
-    <dgm:cxn modelId="{095551EB-3787-4A6E-BD18-4FA4FB527F74}" type="presParOf" srcId="{5AA45857-0D38-47C9-A8BE-F116671FE843}" destId="{2DB18D42-E372-45EA-B2B9-C806C9A37DB2}" srcOrd="1" destOrd="0" presId="urn:microsoft.com/office/officeart/2005/8/layout/chevron2"/>
-    <dgm:cxn modelId="{33090427-A9FD-48BF-B4E6-E5ED937810B1}" type="presParOf" srcId="{D4D17A9C-0DD6-4BD0-BA1C-DD1A279DAF7C}" destId="{9872FE3A-44F6-4F45-9E08-DD17C8E2CDAE}" srcOrd="5" destOrd="0" presId="urn:microsoft.com/office/officeart/2005/8/layout/chevron2"/>
-    <dgm:cxn modelId="{9166FD06-29F5-4324-B34F-53399AAAFAD1}" type="presParOf" srcId="{D4D17A9C-0DD6-4BD0-BA1C-DD1A279DAF7C}" destId="{7D2FEC29-8020-49B5-AA4E-608588E35D3C}" srcOrd="6" destOrd="0" presId="urn:microsoft.com/office/officeart/2005/8/layout/chevron2"/>
-    <dgm:cxn modelId="{F7AE2593-30B2-4A53-90CB-53BA39A7023A}" type="presParOf" srcId="{7D2FEC29-8020-49B5-AA4E-608588E35D3C}" destId="{D8428D6A-1D3A-4335-A542-7F37016DEE6D}" srcOrd="0" destOrd="0" presId="urn:microsoft.com/office/officeart/2005/8/layout/chevron2"/>
-    <dgm:cxn modelId="{0638EF2A-473D-434E-8A18-7A91B639CD8F}" type="presParOf" srcId="{7D2FEC29-8020-49B5-AA4E-608588E35D3C}" destId="{3694CE9D-16E2-4DAE-AF2A-C516F3D0DDE8}" srcOrd="1" destOrd="0" presId="urn:microsoft.com/office/officeart/2005/8/layout/chevron2"/>
+    <dgm:cxn modelId="{5495ABBA-DE0F-49A6-A52B-DBEF9685936D}" type="presParOf" srcId="{D4D17A9C-0DD6-4BD0-BA1C-DD1A279DAF7C}" destId="{33ECAA16-4700-4E45-AE42-712413333D7A}" srcOrd="0" destOrd="0" presId="urn:microsoft.com/office/officeart/2005/8/layout/chevron2"/>
+    <dgm:cxn modelId="{081BF574-F1F6-4A81-B96E-BF82EAF028B9}" type="presParOf" srcId="{33ECAA16-4700-4E45-AE42-712413333D7A}" destId="{665A29DD-DFC9-4D8E-83A4-D115B43341E7}" srcOrd="0" destOrd="0" presId="urn:microsoft.com/office/officeart/2005/8/layout/chevron2"/>
+    <dgm:cxn modelId="{8A4C3ADB-18DD-4763-BC88-6384F251ACFA}" type="presParOf" srcId="{33ECAA16-4700-4E45-AE42-712413333D7A}" destId="{96D2911D-D462-4789-B42E-088034A81A84}" srcOrd="1" destOrd="0" presId="urn:microsoft.com/office/officeart/2005/8/layout/chevron2"/>
+    <dgm:cxn modelId="{E2F43D31-52F3-4DEF-BFC5-F537D9A81282}" type="presParOf" srcId="{D4D17A9C-0DD6-4BD0-BA1C-DD1A279DAF7C}" destId="{CDD40CDC-DB60-4F80-8B04-B9FCC6FD3B10}" srcOrd="1" destOrd="0" presId="urn:microsoft.com/office/officeart/2005/8/layout/chevron2"/>
+    <dgm:cxn modelId="{C5BEE8A6-3014-4DD3-8CA1-3C622E14BA02}" type="presParOf" srcId="{D4D17A9C-0DD6-4BD0-BA1C-DD1A279DAF7C}" destId="{A6E81614-BE47-4D5B-A25B-28EA45005495}" srcOrd="2" destOrd="0" presId="urn:microsoft.com/office/officeart/2005/8/layout/chevron2"/>
+    <dgm:cxn modelId="{C8147D17-B1FF-4835-B18D-FC0B1F00D45B}" type="presParOf" srcId="{A6E81614-BE47-4D5B-A25B-28EA45005495}" destId="{739335CE-5151-47E1-A5BF-05995CBF9A82}" srcOrd="0" destOrd="0" presId="urn:microsoft.com/office/officeart/2005/8/layout/chevron2"/>
+    <dgm:cxn modelId="{1C46BC74-FA97-47C6-916F-3642C00005F9}" type="presParOf" srcId="{A6E81614-BE47-4D5B-A25B-28EA45005495}" destId="{99242DD0-614D-4E07-9431-E93317E80917}" srcOrd="1" destOrd="0" presId="urn:microsoft.com/office/officeart/2005/8/layout/chevron2"/>
+    <dgm:cxn modelId="{FF599A91-C206-4877-9F50-636EF7F3FB51}" type="presParOf" srcId="{D4D17A9C-0DD6-4BD0-BA1C-DD1A279DAF7C}" destId="{16287E9C-9724-4785-8757-B3156FAB554B}" srcOrd="3" destOrd="0" presId="urn:microsoft.com/office/officeart/2005/8/layout/chevron2"/>
+    <dgm:cxn modelId="{A76C1AB4-07CC-47CA-BA5A-AA7680F50FE9}" type="presParOf" srcId="{D4D17A9C-0DD6-4BD0-BA1C-DD1A279DAF7C}" destId="{5AA45857-0D38-47C9-A8BE-F116671FE843}" srcOrd="4" destOrd="0" presId="urn:microsoft.com/office/officeart/2005/8/layout/chevron2"/>
+    <dgm:cxn modelId="{3F56EEFD-0D8D-4942-8321-BD723855C3AF}" type="presParOf" srcId="{5AA45857-0D38-47C9-A8BE-F116671FE843}" destId="{A35FC70C-2E24-4E7D-9FD2-E63462CAFBFD}" srcOrd="0" destOrd="0" presId="urn:microsoft.com/office/officeart/2005/8/layout/chevron2"/>
+    <dgm:cxn modelId="{73E66D5E-2D3E-4C92-8375-DD26D8B14C61}" type="presParOf" srcId="{5AA45857-0D38-47C9-A8BE-F116671FE843}" destId="{2DB18D42-E372-45EA-B2B9-C806C9A37DB2}" srcOrd="1" destOrd="0" presId="urn:microsoft.com/office/officeart/2005/8/layout/chevron2"/>
+    <dgm:cxn modelId="{3E7A36EB-A20F-4E72-B1C8-74F4F6235CE2}" type="presParOf" srcId="{D4D17A9C-0DD6-4BD0-BA1C-DD1A279DAF7C}" destId="{9872FE3A-44F6-4F45-9E08-DD17C8E2CDAE}" srcOrd="5" destOrd="0" presId="urn:microsoft.com/office/officeart/2005/8/layout/chevron2"/>
+    <dgm:cxn modelId="{1EDE71A5-3DA6-42A3-B886-A9EEA37636D9}" type="presParOf" srcId="{D4D17A9C-0DD6-4BD0-BA1C-DD1A279DAF7C}" destId="{7D2FEC29-8020-49B5-AA4E-608588E35D3C}" srcOrd="6" destOrd="0" presId="urn:microsoft.com/office/officeart/2005/8/layout/chevron2"/>
+    <dgm:cxn modelId="{35DAB665-0E54-4B46-B51B-4310E8E86D63}" type="presParOf" srcId="{7D2FEC29-8020-49B5-AA4E-608588E35D3C}" destId="{D8428D6A-1D3A-4335-A542-7F37016DEE6D}" srcOrd="0" destOrd="0" presId="urn:microsoft.com/office/officeart/2005/8/layout/chevron2"/>
+    <dgm:cxn modelId="{6CEAD9B0-B15D-4AF5-A34D-A30ACE094EDC}" type="presParOf" srcId="{7D2FEC29-8020-49B5-AA4E-608588E35D3C}" destId="{3694CE9D-16E2-4DAE-AF2A-C516F3D0DDE8}" srcOrd="1" destOrd="0" presId="urn:microsoft.com/office/officeart/2005/8/layout/chevron2"/>
+    <dgm:cxn modelId="{C0241145-6F5D-48A6-8B50-8E14A5085E46}" type="presParOf" srcId="{D4D17A9C-0DD6-4BD0-BA1C-DD1A279DAF7C}" destId="{CF60E43E-50D5-430C-9C11-342A7EEFBA22}" srcOrd="7" destOrd="0" presId="urn:microsoft.com/office/officeart/2005/8/layout/chevron2"/>
+    <dgm:cxn modelId="{CDE62C2C-AD6E-4510-B3EC-06A203F58261}" type="presParOf" srcId="{D4D17A9C-0DD6-4BD0-BA1C-DD1A279DAF7C}" destId="{E4033BF1-CDB5-4735-9BD9-7AB450923AC8}" srcOrd="8" destOrd="0" presId="urn:microsoft.com/office/officeart/2005/8/layout/chevron2"/>
+    <dgm:cxn modelId="{9201E855-45C4-489E-A1C0-EC6205AE73EC}" type="presParOf" srcId="{E4033BF1-CDB5-4735-9BD9-7AB450923AC8}" destId="{0E923790-1D77-44C9-90CC-7E8738E8D1C4}" srcOrd="0" destOrd="0" presId="urn:microsoft.com/office/officeart/2005/8/layout/chevron2"/>
+    <dgm:cxn modelId="{4B2DA6EB-B9FF-4E18-86B0-DBC4A464E062}" type="presParOf" srcId="{E4033BF1-CDB5-4735-9BD9-7AB450923AC8}" destId="{9D75B86D-0D2D-42BA-8BDE-FF89B90EA005}" srcOrd="1" destOrd="0" presId="urn:microsoft.com/office/officeart/2005/8/layout/chevron2"/>
   </dgm:cxnLst>
   <dgm:bg/>
   <dgm:whole/>
@@ -1777,8 +1830,8 @@
       </dsp:nvSpPr>
       <dsp:spPr>
         <a:xfrm rot="5400000">
-          <a:off x="-192487" y="193619"/>
-          <a:ext cx="1283246" cy="898272"/>
+          <a:off x="-155822" y="156481"/>
+          <a:ext cx="1038818" cy="727173"/>
         </a:xfrm>
         <a:prstGeom prst="chevron">
           <a:avLst/>
@@ -1820,12 +1873,12 @@
         </a:fontRef>
       </dsp:style>
       <dsp:txBody>
-        <a:bodyPr spcFirstLastPara="0" vert="horz" wrap="square" lIns="6985" tIns="6985" rIns="6985" bIns="6985" numCol="1" spcCol="1270" anchor="ctr" anchorCtr="0">
+        <a:bodyPr spcFirstLastPara="0" vert="horz" wrap="square" lIns="5715" tIns="5715" rIns="5715" bIns="5715" numCol="1" spcCol="1270" anchor="ctr" anchorCtr="0">
           <a:noAutofit/>
         </a:bodyPr>
         <a:lstStyle/>
         <a:p>
-          <a:pPr marL="0" lvl="0" indent="0" algn="ctr" defTabSz="488950" rtl="0">
+          <a:pPr marL="0" lvl="0" indent="0" algn="ctr" defTabSz="400050" rtl="0">
             <a:lnSpc>
               <a:spcPct val="90000"/>
             </a:lnSpc>
@@ -1838,18 +1891,18 @@
             <a:buNone/>
           </a:pPr>
           <a:r>
-            <a:rPr lang="en-US" sz="1100" b="0" i="0" u="none" strike="noStrike" kern="1200" cap="none" baseline="0" noProof="0" dirty="0">
+            <a:rPr lang="en-US" sz="900" b="0" i="0" u="none" strike="noStrike" kern="1200" cap="none" baseline="0" noProof="0" dirty="0">
               <a:latin typeface="Calibri"/>
               <a:cs typeface="Calibri"/>
             </a:rPr>
             <a:t>No base images</a:t>
           </a:r>
-          <a:endParaRPr lang="en-US" sz="1100" kern="1200" dirty="0"/>
+          <a:endParaRPr lang="en-US" sz="900" kern="1200" dirty="0"/>
         </a:p>
       </dsp:txBody>
       <dsp:txXfrm rot="-5400000">
-        <a:off x="0" y="450268"/>
-        <a:ext cx="898272" cy="384974"/>
+        <a:off x="1" y="364246"/>
+        <a:ext cx="727173" cy="311645"/>
       </dsp:txXfrm>
     </dsp:sp>
     <dsp:sp modelId="{96D2911D-D462-4789-B42E-088034A81A84}">
@@ -1859,8 +1912,8 @@
       </dsp:nvSpPr>
       <dsp:spPr>
         <a:xfrm rot="5400000">
-          <a:off x="1165660" y="-266254"/>
-          <a:ext cx="834110" cy="1368885"/>
+          <a:off x="1159549" y="-431717"/>
+          <a:ext cx="675232" cy="1539984"/>
         </a:xfrm>
         <a:prstGeom prst="round2SameRect">
           <a:avLst/>
@@ -1948,8 +2001,8 @@
         </a:p>
       </dsp:txBody>
       <dsp:txXfrm rot="-5400000">
-        <a:off x="898273" y="41851"/>
-        <a:ext cx="1328167" cy="752674"/>
+        <a:off x="727173" y="33621"/>
+        <a:ext cx="1507022" cy="609308"/>
       </dsp:txXfrm>
     </dsp:sp>
     <dsp:sp modelId="{739335CE-5151-47E1-A5BF-05995CBF9A82}">
@@ -1959,8 +2012,8 @@
       </dsp:nvSpPr>
       <dsp:spPr>
         <a:xfrm rot="5400000">
-          <a:off x="-192487" y="1224197"/>
-          <a:ext cx="1283246" cy="898272"/>
+          <a:off x="-155822" y="990758"/>
+          <a:ext cx="1038818" cy="727173"/>
         </a:xfrm>
         <a:prstGeom prst="chevron">
           <a:avLst/>
@@ -2002,12 +2055,12 @@
         </a:fontRef>
       </dsp:style>
       <dsp:txBody>
-        <a:bodyPr spcFirstLastPara="0" vert="horz" wrap="square" lIns="6985" tIns="6985" rIns="6985" bIns="6985" numCol="1" spcCol="1270" anchor="ctr" anchorCtr="0">
+        <a:bodyPr spcFirstLastPara="0" vert="horz" wrap="square" lIns="5715" tIns="5715" rIns="5715" bIns="5715" numCol="1" spcCol="1270" anchor="ctr" anchorCtr="0">
           <a:noAutofit/>
         </a:bodyPr>
         <a:lstStyle/>
         <a:p>
-          <a:pPr marL="0" lvl="0" indent="0" algn="ctr" defTabSz="488950" rtl="0">
+          <a:pPr marL="0" lvl="0" indent="0" algn="ctr" defTabSz="400050" rtl="0">
             <a:lnSpc>
               <a:spcPct val="90000"/>
             </a:lnSpc>
@@ -2020,17 +2073,17 @@
             <a:buNone/>
           </a:pPr>
           <a:r>
-            <a:rPr lang="en-US" sz="1100" kern="1200" dirty="0">
+            <a:rPr lang="en-US" sz="900" kern="1200" dirty="0">
               <a:latin typeface="Calibri"/>
             </a:rPr>
             <a:t>Base image available</a:t>
           </a:r>
-          <a:endParaRPr lang="en-US" sz="1100" kern="1200" dirty="0"/>
+          <a:endParaRPr lang="en-US" sz="900" kern="1200" dirty="0"/>
         </a:p>
       </dsp:txBody>
       <dsp:txXfrm rot="-5400000">
-        <a:off x="0" y="1480846"/>
-        <a:ext cx="898272" cy="384974"/>
+        <a:off x="1" y="1198523"/>
+        <a:ext cx="727173" cy="311645"/>
       </dsp:txXfrm>
     </dsp:sp>
     <dsp:sp modelId="{99242DD0-614D-4E07-9431-E93317E80917}">
@@ -2040,8 +2093,8 @@
       </dsp:nvSpPr>
       <dsp:spPr>
         <a:xfrm rot="5400000">
-          <a:off x="1165660" y="764322"/>
-          <a:ext cx="834110" cy="1368885"/>
+          <a:off x="1159549" y="402559"/>
+          <a:ext cx="675232" cy="1539984"/>
         </a:xfrm>
         <a:prstGeom prst="round2SameRect">
           <a:avLst/>
@@ -2165,19 +2218,7 @@
             <a:rPr lang="en-US" sz="600" kern="1200" dirty="0">
               <a:latin typeface="Calibri"/>
             </a:rPr>
-            <a:t>Build </a:t>
-          </a:r>
-          <a:r>
-            <a:rPr lang="en-US" sz="600" kern="1200" dirty="0" err="1">
-              <a:latin typeface="Calibri"/>
-            </a:rPr>
-            <a:t>devel</a:t>
-          </a:r>
-          <a:r>
-            <a:rPr lang="en-US" sz="600" kern="1200" dirty="0">
-              <a:latin typeface="Calibri"/>
-            </a:rPr>
-            <a:t> image using base image</a:t>
+            <a:t>Build devel image using base image</a:t>
           </a:r>
           <a:endParaRPr lang="en-US" sz="600" kern="1200" dirty="0"/>
         </a:p>
@@ -2244,8 +2285,8 @@
         </a:p>
       </dsp:txBody>
       <dsp:txXfrm rot="-5400000">
-        <a:off x="898273" y="1072427"/>
-        <a:ext cx="1328167" cy="752674"/>
+        <a:off x="727173" y="867897"/>
+        <a:ext cx="1507022" cy="609308"/>
       </dsp:txXfrm>
     </dsp:sp>
     <dsp:sp modelId="{A35FC70C-2E24-4E7D-9FD2-E63462CAFBFD}">
@@ -2255,8 +2296,8 @@
       </dsp:nvSpPr>
       <dsp:spPr>
         <a:xfrm rot="5400000">
-          <a:off x="-192487" y="2254774"/>
-          <a:ext cx="1283246" cy="898272"/>
+          <a:off x="-155822" y="1825035"/>
+          <a:ext cx="1038818" cy="727173"/>
         </a:xfrm>
         <a:prstGeom prst="chevron">
           <a:avLst/>
@@ -2298,12 +2339,12 @@
         </a:fontRef>
       </dsp:style>
       <dsp:txBody>
-        <a:bodyPr spcFirstLastPara="0" vert="horz" wrap="square" lIns="6985" tIns="6985" rIns="6985" bIns="6985" numCol="1" spcCol="1270" anchor="ctr" anchorCtr="0">
+        <a:bodyPr spcFirstLastPara="0" vert="horz" wrap="square" lIns="5715" tIns="5715" rIns="5715" bIns="5715" numCol="1" spcCol="1270" anchor="ctr" anchorCtr="0">
           <a:noAutofit/>
         </a:bodyPr>
         <a:lstStyle/>
         <a:p>
-          <a:pPr marL="0" lvl="0" indent="0" algn="ctr" defTabSz="488950" rtl="0">
+          <a:pPr marL="0" lvl="0" indent="0" algn="ctr" defTabSz="400050" rtl="0">
             <a:lnSpc>
               <a:spcPct val="90000"/>
             </a:lnSpc>
@@ -2316,17 +2357,17 @@
             <a:buNone/>
           </a:pPr>
           <a:r>
-            <a:rPr lang="en-US" sz="1100" kern="1200" dirty="0">
+            <a:rPr lang="en-US" sz="900" kern="1200" dirty="0">
               <a:latin typeface="Calibri"/>
             </a:rPr>
             <a:t>Devel image available</a:t>
           </a:r>
-          <a:endParaRPr lang="en-US" sz="1100" kern="1200" dirty="0"/>
+          <a:endParaRPr lang="en-US" sz="900" kern="1200" dirty="0"/>
         </a:p>
       </dsp:txBody>
       <dsp:txXfrm rot="-5400000">
-        <a:off x="0" y="2511423"/>
-        <a:ext cx="898272" cy="384974"/>
+        <a:off x="1" y="2032800"/>
+        <a:ext cx="727173" cy="311645"/>
       </dsp:txXfrm>
     </dsp:sp>
     <dsp:sp modelId="{2DB18D42-E372-45EA-B2B9-C806C9A37DB2}">
@@ -2336,8 +2377,8 @@
       </dsp:nvSpPr>
       <dsp:spPr>
         <a:xfrm rot="5400000">
-          <a:off x="1165660" y="1794900"/>
-          <a:ext cx="834110" cy="1368885"/>
+          <a:off x="1159549" y="1236836"/>
+          <a:ext cx="675232" cy="1539984"/>
         </a:xfrm>
         <a:prstGeom prst="round2SameRect">
           <a:avLst/>
@@ -2507,8 +2548,8 @@
         </a:p>
       </dsp:txBody>
       <dsp:txXfrm rot="-5400000">
-        <a:off x="898273" y="2103005"/>
-        <a:ext cx="1328167" cy="752674"/>
+        <a:off x="727173" y="1702174"/>
+        <a:ext cx="1507022" cy="609308"/>
       </dsp:txXfrm>
     </dsp:sp>
     <dsp:sp modelId="{D8428D6A-1D3A-4335-A542-7F37016DEE6D}">
@@ -2518,8 +2559,8 @@
       </dsp:nvSpPr>
       <dsp:spPr>
         <a:xfrm rot="5400000">
-          <a:off x="-192487" y="3285352"/>
-          <a:ext cx="1283246" cy="898272"/>
+          <a:off x="-155822" y="2659312"/>
+          <a:ext cx="1038818" cy="727173"/>
         </a:xfrm>
         <a:prstGeom prst="chevron">
           <a:avLst/>
@@ -2561,12 +2602,12 @@
         </a:fontRef>
       </dsp:style>
       <dsp:txBody>
-        <a:bodyPr spcFirstLastPara="0" vert="horz" wrap="square" lIns="6985" tIns="6985" rIns="6985" bIns="6985" numCol="1" spcCol="1270" anchor="ctr" anchorCtr="0">
+        <a:bodyPr spcFirstLastPara="0" vert="horz" wrap="square" lIns="5715" tIns="5715" rIns="5715" bIns="5715" numCol="1" spcCol="1270" anchor="ctr" anchorCtr="0">
           <a:noAutofit/>
         </a:bodyPr>
         <a:lstStyle/>
         <a:p>
-          <a:pPr marL="0" lvl="0" indent="0" algn="ctr" defTabSz="488950" rtl="0">
+          <a:pPr marL="0" lvl="0" indent="0" algn="ctr" defTabSz="400050" rtl="0">
             <a:lnSpc>
               <a:spcPct val="90000"/>
             </a:lnSpc>
@@ -2579,25 +2620,25 @@
             <a:buNone/>
           </a:pPr>
           <a:r>
-            <a:rPr lang="en-US" sz="1100" kern="1200" dirty="0">
+            <a:rPr lang="en-US" sz="900" kern="1200" dirty="0">
               <a:latin typeface="Calibri"/>
             </a:rPr>
-            <a:t>Release image </a:t>
+            <a:t>Frozen image </a:t>
           </a:r>
           <a:br>
-            <a:rPr lang="en-US" sz="1100" kern="1200" dirty="0">
+            <a:rPr lang="en-US" sz="900" kern="1200" dirty="0">
               <a:latin typeface="Calibri"/>
             </a:rPr>
           </a:br>
           <a:r>
-            <a:rPr lang="en-US" sz="1100" kern="1200" dirty="0"/>
+            <a:rPr lang="en-US" sz="900" kern="1200" dirty="0"/>
             <a:t>available</a:t>
           </a:r>
         </a:p>
       </dsp:txBody>
       <dsp:txXfrm rot="-5400000">
-        <a:off x="0" y="3542001"/>
-        <a:ext cx="898272" cy="384974"/>
+        <a:off x="1" y="2867077"/>
+        <a:ext cx="727173" cy="311645"/>
       </dsp:txXfrm>
     </dsp:sp>
     <dsp:sp modelId="{3694CE9D-16E2-4DAE-AF2A-C516F3D0DDE8}">
@@ -2607,8 +2648,8 @@
       </dsp:nvSpPr>
       <dsp:spPr>
         <a:xfrm rot="5400000">
-          <a:off x="1165660" y="2825477"/>
-          <a:ext cx="834110" cy="1368885"/>
+          <a:off x="1159549" y="2071113"/>
+          <a:ext cx="675232" cy="1539984"/>
         </a:xfrm>
         <a:prstGeom prst="round2SameRect">
           <a:avLst/>
@@ -2688,8 +2729,171 @@
         </a:p>
       </dsp:txBody>
       <dsp:txXfrm rot="-5400000">
-        <a:off x="898273" y="3133582"/>
-        <a:ext cx="1328167" cy="752674"/>
+        <a:off x="727173" y="2536451"/>
+        <a:ext cx="1507022" cy="609308"/>
+      </dsp:txXfrm>
+    </dsp:sp>
+    <dsp:sp modelId="{0E923790-1D77-44C9-90CC-7E8738E8D1C4}">
+      <dsp:nvSpPr>
+        <dsp:cNvPr id="0" name=""/>
+        <dsp:cNvSpPr/>
+      </dsp:nvSpPr>
+      <dsp:spPr>
+        <a:xfrm rot="5400000">
+          <a:off x="-155822" y="3493589"/>
+          <a:ext cx="1038818" cy="727173"/>
+        </a:xfrm>
+        <a:prstGeom prst="chevron">
+          <a:avLst/>
+        </a:prstGeom>
+        <a:solidFill>
+          <a:schemeClr val="accent1">
+            <a:hueOff val="0"/>
+            <a:satOff val="0"/>
+            <a:lumOff val="0"/>
+            <a:alphaOff val="0"/>
+          </a:schemeClr>
+        </a:solidFill>
+        <a:ln w="12700" cap="flat" cmpd="sng" algn="ctr">
+          <a:solidFill>
+            <a:schemeClr val="accent1">
+              <a:hueOff val="0"/>
+              <a:satOff val="0"/>
+              <a:lumOff val="0"/>
+              <a:alphaOff val="0"/>
+            </a:schemeClr>
+          </a:solidFill>
+          <a:prstDash val="solid"/>
+          <a:miter lim="800000"/>
+        </a:ln>
+        <a:effectLst/>
+      </dsp:spPr>
+      <dsp:style>
+        <a:lnRef idx="2">
+          <a:scrgbClr r="0" g="0" b="0"/>
+        </a:lnRef>
+        <a:fillRef idx="1">
+          <a:scrgbClr r="0" g="0" b="0"/>
+        </a:fillRef>
+        <a:effectRef idx="0">
+          <a:scrgbClr r="0" g="0" b="0"/>
+        </a:effectRef>
+        <a:fontRef idx="minor">
+          <a:schemeClr val="lt1"/>
+        </a:fontRef>
+      </dsp:style>
+      <dsp:txBody>
+        <a:bodyPr spcFirstLastPara="0" vert="horz" wrap="square" lIns="5715" tIns="5715" rIns="5715" bIns="5715" numCol="1" spcCol="1270" anchor="ctr" anchorCtr="0">
+          <a:noAutofit/>
+        </a:bodyPr>
+        <a:lstStyle/>
+        <a:p>
+          <a:pPr marL="0" lvl="0" indent="0" algn="ctr" defTabSz="400050" rtl="0">
+            <a:lnSpc>
+              <a:spcPct val="90000"/>
+            </a:lnSpc>
+            <a:spcBef>
+              <a:spcPct val="0"/>
+            </a:spcBef>
+            <a:spcAft>
+              <a:spcPct val="35000"/>
+            </a:spcAft>
+            <a:buNone/>
+          </a:pPr>
+          <a:r>
+            <a:rPr lang="en-US" sz="900" kern="1200" dirty="0">
+              <a:latin typeface="Calibri"/>
+              <a:ea typeface="Calibri"/>
+              <a:cs typeface="Calibri"/>
+            </a:rPr>
+            <a:t>Release image</a:t>
+          </a:r>
+        </a:p>
+      </dsp:txBody>
+      <dsp:txXfrm rot="-5400000">
+        <a:off x="1" y="3701354"/>
+        <a:ext cx="727173" cy="311645"/>
+      </dsp:txXfrm>
+    </dsp:sp>
+    <dsp:sp modelId="{9D75B86D-0D2D-42BA-8BDE-FF89B90EA005}">
+      <dsp:nvSpPr>
+        <dsp:cNvPr id="0" name=""/>
+        <dsp:cNvSpPr/>
+      </dsp:nvSpPr>
+      <dsp:spPr>
+        <a:xfrm rot="5400000">
+          <a:off x="1159549" y="2905390"/>
+          <a:ext cx="675232" cy="1539984"/>
+        </a:xfrm>
+        <a:prstGeom prst="round2SameRect">
+          <a:avLst/>
+        </a:prstGeom>
+        <a:solidFill>
+          <a:schemeClr val="lt1">
+            <a:alpha val="90000"/>
+            <a:hueOff val="0"/>
+            <a:satOff val="0"/>
+            <a:lumOff val="0"/>
+            <a:alphaOff val="0"/>
+          </a:schemeClr>
+        </a:solidFill>
+        <a:ln w="12700" cap="flat" cmpd="sng" algn="ctr">
+          <a:solidFill>
+            <a:schemeClr val="accent1">
+              <a:hueOff val="0"/>
+              <a:satOff val="0"/>
+              <a:lumOff val="0"/>
+              <a:alphaOff val="0"/>
+            </a:schemeClr>
+          </a:solidFill>
+          <a:prstDash val="solid"/>
+          <a:miter lim="800000"/>
+        </a:ln>
+        <a:effectLst/>
+      </dsp:spPr>
+      <dsp:style>
+        <a:lnRef idx="2">
+          <a:scrgbClr r="0" g="0" b="0"/>
+        </a:lnRef>
+        <a:fillRef idx="1">
+          <a:scrgbClr r="0" g="0" b="0"/>
+        </a:fillRef>
+        <a:effectRef idx="0">
+          <a:scrgbClr r="0" g="0" b="0"/>
+        </a:effectRef>
+        <a:fontRef idx="minor"/>
+      </dsp:style>
+      <dsp:txBody>
+        <a:bodyPr spcFirstLastPara="0" vert="horz" wrap="square" lIns="42672" tIns="3810" rIns="3810" bIns="3810" numCol="1" spcCol="1270" anchor="ctr" anchorCtr="0">
+          <a:noAutofit/>
+        </a:bodyPr>
+        <a:lstStyle/>
+        <a:p>
+          <a:pPr marL="57150" lvl="1" indent="-57150" algn="l" defTabSz="266700" rtl="0">
+            <a:lnSpc>
+              <a:spcPct val="90000"/>
+            </a:lnSpc>
+            <a:spcBef>
+              <a:spcPct val="0"/>
+            </a:spcBef>
+            <a:spcAft>
+              <a:spcPct val="15000"/>
+            </a:spcAft>
+            <a:buChar char="•"/>
+          </a:pPr>
+          <a:r>
+            <a:rPr lang="en-US" sz="600" kern="1200" dirty="0">
+              <a:latin typeface="Calibri"/>
+              <a:ea typeface="Calibri"/>
+              <a:cs typeface="Calibri"/>
+            </a:rPr>
+            <a:t>Normal Docker Image</a:t>
+          </a:r>
+        </a:p>
+      </dsp:txBody>
+      <dsp:txXfrm rot="-5400000">
+        <a:off x="727173" y="3370728"/>
+        <a:ext cx="1507022" cy="609308"/>
       </dsp:txXfrm>
     </dsp:sp>
   </dsp:spTree>
@@ -4068,7 +4272,7 @@
           <a:p>
             <a:fld id="{1DFFC882-5822-4B05-A69C-E82DB27AD127}" type="datetimeFigureOut">
               <a:rPr lang="de-DE" smtClean="0"/>
-              <a:t>08.09.2020</a:t>
+              <a:t>14.02.2025</a:t>
             </a:fld>
             <a:endParaRPr lang="de-DE"/>
           </a:p>
@@ -4134,7 +4338,7 @@
           <a:p>
             <a:fld id="{643D732C-73A6-4C93-AEC8-99901377BA2D}" type="slidenum">
               <a:rPr lang="de-DE" smtClean="0"/>
-              <a:t>‹#›</a:t>
+              <a:t>‹Nr.›</a:t>
             </a:fld>
             <a:endParaRPr lang="de-DE"/>
           </a:p>
@@ -4280,7 +4484,7 @@
           <a:p>
             <a:fld id="{C764DE79-268F-4C1A-8933-263129D2AF90}" type="datetimeFigureOut">
               <a:rPr lang="en-US" dirty="0"/>
-              <a:t>9/8/2020</a:t>
+              <a:t>2/14/2025</a:t>
             </a:fld>
             <a:endParaRPr lang="en-US" dirty="0"/>
           </a:p>
@@ -4322,7 +4526,7 @@
           <a:p>
             <a:fld id="{48F63A3B-78C7-47BE-AE5E-E10140E04643}" type="slidenum">
               <a:rPr lang="en-US" dirty="0"/>
-              <a:t>‹#›</a:t>
+              <a:t>‹Nr.›</a:t>
             </a:fld>
             <a:endParaRPr lang="en-US" dirty="0"/>
           </a:p>
@@ -4448,7 +4652,7 @@
           <a:p>
             <a:fld id="{C764DE79-268F-4C1A-8933-263129D2AF90}" type="datetimeFigureOut">
               <a:rPr lang="en-US" dirty="0"/>
-              <a:t>9/8/2020</a:t>
+              <a:t>2/14/2025</a:t>
             </a:fld>
             <a:endParaRPr lang="en-US" dirty="0"/>
           </a:p>
@@ -4490,7 +4694,7 @@
           <a:p>
             <a:fld id="{48F63A3B-78C7-47BE-AE5E-E10140E04643}" type="slidenum">
               <a:rPr lang="en-US" dirty="0"/>
-              <a:t>‹#›</a:t>
+              <a:t>‹Nr.›</a:t>
             </a:fld>
             <a:endParaRPr lang="en-US" dirty="0"/>
           </a:p>
@@ -4626,7 +4830,7 @@
           <a:p>
             <a:fld id="{C764DE79-268F-4C1A-8933-263129D2AF90}" type="datetimeFigureOut">
               <a:rPr lang="en-US" dirty="0"/>
-              <a:t>9/8/2020</a:t>
+              <a:t>2/14/2025</a:t>
             </a:fld>
             <a:endParaRPr lang="en-US" dirty="0"/>
           </a:p>
@@ -4668,7 +4872,7 @@
           <a:p>
             <a:fld id="{48F63A3B-78C7-47BE-AE5E-E10140E04643}" type="slidenum">
               <a:rPr lang="en-US" dirty="0"/>
-              <a:t>‹#›</a:t>
+              <a:t>‹Nr.›</a:t>
             </a:fld>
             <a:endParaRPr lang="en-US" dirty="0"/>
           </a:p>
@@ -4794,7 +4998,7 @@
           <a:p>
             <a:fld id="{C764DE79-268F-4C1A-8933-263129D2AF90}" type="datetimeFigureOut">
               <a:rPr lang="en-US" dirty="0"/>
-              <a:t>9/8/2020</a:t>
+              <a:t>2/14/2025</a:t>
             </a:fld>
             <a:endParaRPr lang="en-US" dirty="0"/>
           </a:p>
@@ -4836,7 +5040,7 @@
           <a:p>
             <a:fld id="{48F63A3B-78C7-47BE-AE5E-E10140E04643}" type="slidenum">
               <a:rPr lang="en-US" dirty="0"/>
-              <a:t>‹#›</a:t>
+              <a:t>‹Nr.›</a:t>
             </a:fld>
             <a:endParaRPr lang="en-US" dirty="0"/>
           </a:p>
@@ -5039,7 +5243,7 @@
           <a:p>
             <a:fld id="{C764DE79-268F-4C1A-8933-263129D2AF90}" type="datetimeFigureOut">
               <a:rPr lang="en-US" dirty="0"/>
-              <a:t>9/8/2020</a:t>
+              <a:t>2/14/2025</a:t>
             </a:fld>
             <a:endParaRPr lang="en-US" dirty="0"/>
           </a:p>
@@ -5081,7 +5285,7 @@
           <a:p>
             <a:fld id="{48F63A3B-78C7-47BE-AE5E-E10140E04643}" type="slidenum">
               <a:rPr lang="en-US" dirty="0"/>
-              <a:t>‹#›</a:t>
+              <a:t>‹Nr.›</a:t>
             </a:fld>
             <a:endParaRPr lang="en-US" dirty="0"/>
           </a:p>
@@ -5268,7 +5472,7 @@
           <a:p>
             <a:fld id="{C764DE79-268F-4C1A-8933-263129D2AF90}" type="datetimeFigureOut">
               <a:rPr lang="en-US" dirty="0"/>
-              <a:t>9/8/2020</a:t>
+              <a:t>2/14/2025</a:t>
             </a:fld>
             <a:endParaRPr lang="en-US" dirty="0"/>
           </a:p>
@@ -5310,7 +5514,7 @@
           <a:p>
             <a:fld id="{48F63A3B-78C7-47BE-AE5E-E10140E04643}" type="slidenum">
               <a:rPr lang="en-US" dirty="0"/>
-              <a:t>‹#›</a:t>
+              <a:t>‹Nr.›</a:t>
             </a:fld>
             <a:endParaRPr lang="en-US" dirty="0"/>
           </a:p>
@@ -5632,7 +5836,7 @@
           <a:p>
             <a:fld id="{C764DE79-268F-4C1A-8933-263129D2AF90}" type="datetimeFigureOut">
               <a:rPr lang="en-US" dirty="0"/>
-              <a:t>9/8/2020</a:t>
+              <a:t>2/14/2025</a:t>
             </a:fld>
             <a:endParaRPr lang="en-US" dirty="0"/>
           </a:p>
@@ -5674,7 +5878,7 @@
           <a:p>
             <a:fld id="{48F63A3B-78C7-47BE-AE5E-E10140E04643}" type="slidenum">
               <a:rPr lang="en-US" dirty="0"/>
-              <a:t>‹#›</a:t>
+              <a:t>‹Nr.›</a:t>
             </a:fld>
             <a:endParaRPr lang="en-US" dirty="0"/>
           </a:p>
@@ -5749,7 +5953,7 @@
           <a:p>
             <a:fld id="{C764DE79-268F-4C1A-8933-263129D2AF90}" type="datetimeFigureOut">
               <a:rPr lang="en-US" dirty="0"/>
-              <a:t>9/8/2020</a:t>
+              <a:t>2/14/2025</a:t>
             </a:fld>
             <a:endParaRPr lang="en-US" dirty="0"/>
           </a:p>
@@ -5791,7 +5995,7 @@
           <a:p>
             <a:fld id="{48F63A3B-78C7-47BE-AE5E-E10140E04643}" type="slidenum">
               <a:rPr lang="en-US" dirty="0"/>
-              <a:t>‹#›</a:t>
+              <a:t>‹Nr.›</a:t>
             </a:fld>
             <a:endParaRPr lang="en-US" dirty="0"/>
           </a:p>
@@ -5844,7 +6048,7 @@
           <a:p>
             <a:fld id="{C764DE79-268F-4C1A-8933-263129D2AF90}" type="datetimeFigureOut">
               <a:rPr lang="en-US" dirty="0"/>
-              <a:t>9/8/2020</a:t>
+              <a:t>2/14/2025</a:t>
             </a:fld>
             <a:endParaRPr lang="en-US" dirty="0"/>
           </a:p>
@@ -5886,7 +6090,7 @@
           <a:p>
             <a:fld id="{48F63A3B-78C7-47BE-AE5E-E10140E04643}" type="slidenum">
               <a:rPr lang="en-US" dirty="0"/>
-              <a:t>‹#›</a:t>
+              <a:t>‹Nr.›</a:t>
             </a:fld>
             <a:endParaRPr lang="en-US" dirty="0"/>
           </a:p>
@@ -6119,7 +6323,7 @@
           <a:p>
             <a:fld id="{C764DE79-268F-4C1A-8933-263129D2AF90}" type="datetimeFigureOut">
               <a:rPr lang="en-US" dirty="0"/>
-              <a:t>9/8/2020</a:t>
+              <a:t>2/14/2025</a:t>
             </a:fld>
             <a:endParaRPr lang="en-US" dirty="0"/>
           </a:p>
@@ -6161,7 +6365,7 @@
           <a:p>
             <a:fld id="{48F63A3B-78C7-47BE-AE5E-E10140E04643}" type="slidenum">
               <a:rPr lang="en-US" dirty="0"/>
-              <a:t>‹#›</a:t>
+              <a:t>‹Nr.›</a:t>
             </a:fld>
             <a:endParaRPr lang="en-US" dirty="0"/>
           </a:p>
@@ -6371,7 +6575,7 @@
           <a:p>
             <a:fld id="{C764DE79-268F-4C1A-8933-263129D2AF90}" type="datetimeFigureOut">
               <a:rPr lang="en-US" dirty="0"/>
-              <a:t>9/8/2020</a:t>
+              <a:t>2/14/2025</a:t>
             </a:fld>
             <a:endParaRPr lang="en-US" dirty="0"/>
           </a:p>
@@ -6413,7 +6617,7 @@
           <a:p>
             <a:fld id="{48F63A3B-78C7-47BE-AE5E-E10140E04643}" type="slidenum">
               <a:rPr lang="en-US" dirty="0"/>
-              <a:t>‹#›</a:t>
+              <a:t>‹Nr.›</a:t>
             </a:fld>
             <a:endParaRPr lang="en-US" dirty="0"/>
           </a:p>
@@ -6582,7 +6786,7 @@
           <a:p>
             <a:fld id="{C764DE79-268F-4C1A-8933-263129D2AF90}" type="datetimeFigureOut">
               <a:rPr lang="en-US" dirty="0"/>
-              <a:t>9/8/2020</a:t>
+              <a:t>2/14/2025</a:t>
             </a:fld>
             <a:endParaRPr lang="en-US" dirty="0"/>
           </a:p>
@@ -6660,7 +6864,7 @@
           <a:p>
             <a:fld id="{48F63A3B-78C7-47BE-AE5E-E10140E04643}" type="slidenum">
               <a:rPr lang="en-US" dirty="0"/>
-              <a:t>‹#›</a:t>
+              <a:t>‹Nr.›</a:t>
             </a:fld>
             <a:endParaRPr lang="en-US" dirty="0"/>
           </a:p>
@@ -6987,12 +7191,60 @@
           <a:chExt cx="0" cy="0"/>
         </a:xfrm>
       </p:grpSpPr>
+      <p:sp>
+        <p:nvSpPr>
+          <p:cNvPr id="18" name="Rectangle: Rounded Corners 17">
+            <a:extLst>
+              <a:ext uri="{FF2B5EF4-FFF2-40B4-BE49-F238E27FC236}">
+                <a16:creationId xmlns:a16="http://schemas.microsoft.com/office/drawing/2014/main" id="{5A2C5507-487E-460B-A016-E6597B62ED06}"/>
+              </a:ext>
+            </a:extLst>
+          </p:cNvPr>
+          <p:cNvSpPr/>
+          <p:nvPr/>
+        </p:nvSpPr>
+        <p:spPr>
+          <a:xfrm>
+            <a:off x="7284468" y="508367"/>
+            <a:ext cx="1557494" cy="4024267"/>
+          </a:xfrm>
+          <a:prstGeom prst="roundRect">
+            <a:avLst/>
+          </a:prstGeom>
+        </p:spPr>
+        <p:style>
+          <a:lnRef idx="2">
+            <a:schemeClr val="accent1">
+              <a:shade val="50000"/>
+            </a:schemeClr>
+          </a:lnRef>
+          <a:fillRef idx="1">
+            <a:schemeClr val="accent1"/>
+          </a:fillRef>
+          <a:effectRef idx="0">
+            <a:schemeClr val="accent1"/>
+          </a:effectRef>
+          <a:fontRef idx="minor">
+            <a:schemeClr val="lt1"/>
+          </a:fontRef>
+        </p:style>
+        <p:txBody>
+          <a:bodyPr rtlCol="0" anchor="ctr"/>
+          <a:lstStyle/>
+          <a:p>
+            <a:pPr algn="ctr"/>
+            <a:endParaRPr lang="en-US">
+              <a:cs typeface="Calibri"/>
+            </a:endParaRPr>
+          </a:p>
+        </p:txBody>
+      </p:sp>
       <p:grpSp>
         <p:nvGrpSpPr>
-          <p:cNvPr id="32" name="Group 31">
+          <p:cNvPr id="17" name="Group 16">
             <a:extLst>
               <a:ext uri="{FF2B5EF4-FFF2-40B4-BE49-F238E27FC236}">
-                <a16:creationId xmlns:a16="http://schemas.microsoft.com/office/drawing/2014/main" id="{CF838435-3EF7-44CF-B5BA-211743D17F71}"/>
+                <a16:creationId xmlns:a16="http://schemas.microsoft.com/office/drawing/2014/main" id="{C6168746-D132-44EE-8688-024723A0A902}"/>
               </a:ext>
             </a:extLst>
           </p:cNvPr>
@@ -7001,18 +7253,18 @@
         </p:nvGrpSpPr>
         <p:grpSpPr>
           <a:xfrm>
-            <a:off x="270049" y="349658"/>
-            <a:ext cx="8547065" cy="4420029"/>
-            <a:chOff x="270049" y="1002801"/>
-            <a:chExt cx="8547065" cy="3648958"/>
+            <a:off x="4211870" y="150493"/>
+            <a:ext cx="2147835" cy="1103062"/>
+            <a:chOff x="5644033" y="1351652"/>
+            <a:chExt cx="2147835" cy="910634"/>
           </a:xfrm>
         </p:grpSpPr>
         <p:sp>
           <p:nvSpPr>
-            <p:cNvPr id="18" name="Rectangle: Rounded Corners 17">
+            <p:cNvPr id="14" name="Flowchart: Magnetic Disk 13">
               <a:extLst>
                 <a:ext uri="{FF2B5EF4-FFF2-40B4-BE49-F238E27FC236}">
-                  <a16:creationId xmlns:a16="http://schemas.microsoft.com/office/drawing/2014/main" id="{5A2C5507-487E-460B-A016-E6597B62ED06}"/>
+                  <a16:creationId xmlns:a16="http://schemas.microsoft.com/office/drawing/2014/main" id="{9AFBD690-FA5D-4E2B-90B7-E907F42B0258}"/>
                 </a:ext>
               </a:extLst>
             </p:cNvPr>
@@ -7021,10 +7273,71 @@
           </p:nvSpPr>
           <p:spPr>
             <a:xfrm>
-              <a:off x="7259620" y="1126985"/>
-              <a:ext cx="1557494" cy="3322236"/>
+              <a:off x="5644033" y="1351652"/>
+              <a:ext cx="2147835" cy="910634"/>
             </a:xfrm>
-            <a:prstGeom prst="roundRect">
+            <a:prstGeom prst="flowChartMagneticDisk">
+              <a:avLst/>
+            </a:prstGeom>
+          </p:spPr>
+          <p:style>
+            <a:lnRef idx="2">
+              <a:schemeClr val="accent1">
+                <a:shade val="50000"/>
+              </a:schemeClr>
+            </a:lnRef>
+            <a:fillRef idx="1">
+              <a:schemeClr val="accent1"/>
+            </a:fillRef>
+            <a:effectRef idx="0">
+              <a:schemeClr val="accent1"/>
+            </a:effectRef>
+            <a:fontRef idx="minor">
+              <a:schemeClr val="lt1"/>
+            </a:fontRef>
+          </p:style>
+          <p:txBody>
+            <a:bodyPr rtlCol="0" anchor="ctr"/>
+            <a:lstStyle/>
+            <a:p>
+              <a:r>
+                <a:rPr lang="en-US" sz="1200" dirty="0">
+                  <a:cs typeface="Calibri"/>
+                </a:rPr>
+                <a:t>base</a:t>
+              </a:r>
+              <a:br>
+                <a:rPr lang="en-US" sz="1200" dirty="0">
+                  <a:cs typeface="Calibri"/>
+                </a:rPr>
+              </a:br>
+              <a:r>
+                <a:rPr lang="en-US" sz="1200" dirty="0">
+                  <a:cs typeface="Calibri"/>
+                </a:rPr>
+                <a:t>container</a:t>
+              </a:r>
+            </a:p>
+          </p:txBody>
+        </p:sp>
+        <p:sp>
+          <p:nvSpPr>
+            <p:cNvPr id="15" name="Flowchart: Multidocument 14">
+              <a:extLst>
+                <a:ext uri="{FF2B5EF4-FFF2-40B4-BE49-F238E27FC236}">
+                  <a16:creationId xmlns:a16="http://schemas.microsoft.com/office/drawing/2014/main" id="{55AB4896-24E7-41F4-948C-C66AD84817A4}"/>
+                </a:ext>
+              </a:extLst>
+            </p:cNvPr>
+            <p:cNvSpPr/>
+            <p:nvPr/>
+          </p:nvSpPr>
+          <p:spPr>
+            <a:xfrm>
+              <a:off x="6390449" y="1714976"/>
+              <a:ext cx="1274885" cy="489857"/>
+            </a:xfrm>
+            <a:prstGeom prst="flowChartMultidocument">
               <a:avLst/>
             </a:prstGeom>
           </p:spPr>
@@ -7049,162 +7362,139 @@
             <a:lstStyle/>
             <a:p>
               <a:pPr algn="ctr"/>
-              <a:endParaRPr lang="en-US">
-                <a:cs typeface="Calibri"/>
-              </a:endParaRPr>
+              <a:r>
+                <a:rPr lang="en-US" sz="900">
+                  <a:cs typeface="Calibri"/>
+                </a:rPr>
+                <a:t>home</a:t>
+              </a:r>
+              <a:br>
+                <a:rPr lang="en-US" sz="900" dirty="0">
+                  <a:cs typeface="Calibri"/>
+                </a:rPr>
+              </a:br>
+              <a:r>
+                <a:rPr lang="en-US" sz="900">
+                  <a:cs typeface="Calibri"/>
+                </a:rPr>
+                <a:t>workspace</a:t>
+              </a:r>
             </a:p>
           </p:txBody>
         </p:sp>
-        <p:grpSp>
-          <p:nvGrpSpPr>
-            <p:cNvPr id="17" name="Group 16">
+      </p:grpSp>
+      <p:sp>
+        <p:nvSpPr>
+          <p:cNvPr id="16" name="Flowchart: Multidocument 15">
+            <a:extLst>
+              <a:ext uri="{FF2B5EF4-FFF2-40B4-BE49-F238E27FC236}">
+                <a16:creationId xmlns:a16="http://schemas.microsoft.com/office/drawing/2014/main" id="{D2118656-0A31-48C4-97BB-2DCFBBD6926D}"/>
+              </a:ext>
+            </a:extLst>
+          </p:cNvPr>
+          <p:cNvSpPr/>
+          <p:nvPr/>
+        </p:nvSpPr>
+        <p:spPr>
+          <a:xfrm>
+            <a:off x="7426412" y="1713772"/>
+            <a:ext cx="1274885" cy="593370"/>
+          </a:xfrm>
+          <a:prstGeom prst="flowChartMultidocument">
+            <a:avLst/>
+          </a:prstGeom>
+        </p:spPr>
+        <p:style>
+          <a:lnRef idx="2">
+            <a:schemeClr val="accent1">
+              <a:shade val="50000"/>
+            </a:schemeClr>
+          </a:lnRef>
+          <a:fillRef idx="1">
+            <a:schemeClr val="accent1"/>
+          </a:fillRef>
+          <a:effectRef idx="0">
+            <a:schemeClr val="accent1"/>
+          </a:effectRef>
+          <a:fontRef idx="minor">
+            <a:schemeClr val="lt1"/>
+          </a:fontRef>
+        </p:style>
+        <p:txBody>
+          <a:bodyPr rtlCol="0" anchor="ctr"/>
+          <a:lstStyle/>
+          <a:p>
+            <a:pPr algn="ctr"/>
+            <a:r>
+              <a:rPr lang="en-US" sz="900" dirty="0">
+                <a:cs typeface="Calibri"/>
+              </a:rPr>
+              <a:t>home</a:t>
+            </a:r>
+            <a:r>
+              <a:rPr lang="en-US" sz="900" dirty="0">
+                <a:ea typeface="+mn-lt"/>
+                <a:cs typeface="+mn-lt"/>
+              </a:rPr>
+              <a:t>, </a:t>
+            </a:r>
+            <a:r>
+              <a:rPr lang="en-US" sz="900" dirty="0" err="1">
+                <a:ea typeface="+mn-lt"/>
+                <a:cs typeface="+mn-lt"/>
+              </a:rPr>
+              <a:t>startscripts</a:t>
+            </a:r>
+            <a:r>
+              <a:rPr lang="en-US" sz="900" dirty="0">
+                <a:ea typeface="+mn-lt"/>
+                <a:cs typeface="+mn-lt"/>
+              </a:rPr>
+              <a:t>,</a:t>
+            </a:r>
+            <a:br>
+              <a:rPr lang="en-US" sz="900" dirty="0">
+                <a:cs typeface="+mn-lt"/>
+              </a:rPr>
+            </a:br>
+            <a:r>
+              <a:rPr lang="en-US" sz="900" dirty="0">
+                <a:cs typeface="Calibri"/>
+              </a:rPr>
+              <a:t>workspace</a:t>
+            </a:r>
+            <a:endParaRPr lang="en-US" sz="900">
+              <a:cs typeface="Calibri"/>
+            </a:endParaRPr>
+          </a:p>
+        </p:txBody>
+      </p:sp>
+      <p:grpSp>
+        <p:nvGrpSpPr>
+          <p:cNvPr id="19" name="Group 18">
+            <a:extLst>
+              <a:ext uri="{FF2B5EF4-FFF2-40B4-BE49-F238E27FC236}">
+                <a16:creationId xmlns:a16="http://schemas.microsoft.com/office/drawing/2014/main" id="{16137C80-B678-4ED0-9B1B-D9B2C8E9AD27}"/>
+              </a:ext>
+            </a:extLst>
+          </p:cNvPr>
+          <p:cNvGrpSpPr/>
+          <p:nvPr/>
+        </p:nvGrpSpPr>
+        <p:grpSpPr>
+          <a:xfrm>
+            <a:off x="4211870" y="1375270"/>
+            <a:ext cx="2147835" cy="1103062"/>
+            <a:chOff x="5644033" y="1351652"/>
+            <a:chExt cx="2147835" cy="910634"/>
+          </a:xfrm>
+        </p:grpSpPr>
+        <p:sp>
+          <p:nvSpPr>
+            <p:cNvPr id="20" name="Flowchart: Magnetic Disk 19">
               <a:extLst>
                 <a:ext uri="{FF2B5EF4-FFF2-40B4-BE49-F238E27FC236}">
-                  <a16:creationId xmlns:a16="http://schemas.microsoft.com/office/drawing/2014/main" id="{C6168746-D132-44EE-8688-024723A0A902}"/>
-                </a:ext>
-              </a:extLst>
-            </p:cNvPr>
-            <p:cNvGrpSpPr/>
-            <p:nvPr/>
-          </p:nvGrpSpPr>
-          <p:grpSpPr>
-            <a:xfrm>
-              <a:off x="4187022" y="1125564"/>
-              <a:ext cx="2147835" cy="910634"/>
-              <a:chOff x="5644033" y="1351652"/>
-              <a:chExt cx="2147835" cy="910634"/>
-            </a:xfrm>
-          </p:grpSpPr>
-          <p:sp>
-            <p:nvSpPr>
-              <p:cNvPr id="14" name="Flowchart: Magnetic Disk 13">
-                <a:extLst>
-                  <a:ext uri="{FF2B5EF4-FFF2-40B4-BE49-F238E27FC236}">
-                    <a16:creationId xmlns:a16="http://schemas.microsoft.com/office/drawing/2014/main" id="{9AFBD690-FA5D-4E2B-90B7-E907F42B0258}"/>
-                  </a:ext>
-                </a:extLst>
-              </p:cNvPr>
-              <p:cNvSpPr/>
-              <p:nvPr/>
-            </p:nvSpPr>
-            <p:spPr>
-              <a:xfrm>
-                <a:off x="5644033" y="1351652"/>
-                <a:ext cx="2147835" cy="910634"/>
-              </a:xfrm>
-              <a:prstGeom prst="flowChartMagneticDisk">
-                <a:avLst/>
-              </a:prstGeom>
-            </p:spPr>
-            <p:style>
-              <a:lnRef idx="2">
-                <a:schemeClr val="accent1">
-                  <a:shade val="50000"/>
-                </a:schemeClr>
-              </a:lnRef>
-              <a:fillRef idx="1">
-                <a:schemeClr val="accent1"/>
-              </a:fillRef>
-              <a:effectRef idx="0">
-                <a:schemeClr val="accent1"/>
-              </a:effectRef>
-              <a:fontRef idx="minor">
-                <a:schemeClr val="lt1"/>
-              </a:fontRef>
-            </p:style>
-            <p:txBody>
-              <a:bodyPr rtlCol="0" anchor="ctr"/>
-              <a:lstStyle/>
-              <a:p>
-                <a:r>
-                  <a:rPr lang="en-US" sz="1200" dirty="0">
-                    <a:cs typeface="Calibri"/>
-                  </a:rPr>
-                  <a:t>base</a:t>
-                </a:r>
-                <a:br>
-                  <a:rPr lang="en-US" sz="1200" dirty="0">
-                    <a:cs typeface="Calibri"/>
-                  </a:rPr>
-                </a:br>
-                <a:r>
-                  <a:rPr lang="en-US" sz="1200" dirty="0">
-                    <a:cs typeface="Calibri"/>
-                  </a:rPr>
-                  <a:t>container</a:t>
-                </a:r>
-              </a:p>
-            </p:txBody>
-          </p:sp>
-          <p:sp>
-            <p:nvSpPr>
-              <p:cNvPr id="15" name="Flowchart: Multidocument 14">
-                <a:extLst>
-                  <a:ext uri="{FF2B5EF4-FFF2-40B4-BE49-F238E27FC236}">
-                    <a16:creationId xmlns:a16="http://schemas.microsoft.com/office/drawing/2014/main" id="{55AB4896-24E7-41F4-948C-C66AD84817A4}"/>
-                  </a:ext>
-                </a:extLst>
-              </p:cNvPr>
-              <p:cNvSpPr/>
-              <p:nvPr/>
-            </p:nvSpPr>
-            <p:spPr>
-              <a:xfrm>
-                <a:off x="6390449" y="1714976"/>
-                <a:ext cx="1274885" cy="489857"/>
-              </a:xfrm>
-              <a:prstGeom prst="flowChartMultidocument">
-                <a:avLst/>
-              </a:prstGeom>
-            </p:spPr>
-            <p:style>
-              <a:lnRef idx="2">
-                <a:schemeClr val="accent1">
-                  <a:shade val="50000"/>
-                </a:schemeClr>
-              </a:lnRef>
-              <a:fillRef idx="1">
-                <a:schemeClr val="accent1"/>
-              </a:fillRef>
-              <a:effectRef idx="0">
-                <a:schemeClr val="accent1"/>
-              </a:effectRef>
-              <a:fontRef idx="minor">
-                <a:schemeClr val="lt1"/>
-              </a:fontRef>
-            </p:style>
-            <p:txBody>
-              <a:bodyPr rtlCol="0" anchor="ctr"/>
-              <a:lstStyle/>
-              <a:p>
-                <a:pPr algn="ctr"/>
-                <a:r>
-                  <a:rPr lang="en-US" sz="900">
-                    <a:cs typeface="Calibri"/>
-                  </a:rPr>
-                  <a:t>home</a:t>
-                </a:r>
-                <a:br>
-                  <a:rPr lang="en-US" sz="900" dirty="0">
-                    <a:cs typeface="Calibri"/>
-                  </a:rPr>
-                </a:br>
-                <a:r>
-                  <a:rPr lang="en-US" sz="900">
-                    <a:cs typeface="Calibri"/>
-                  </a:rPr>
-                  <a:t>workspace</a:t>
-                </a:r>
-              </a:p>
-            </p:txBody>
-          </p:sp>
-        </p:grpSp>
-        <p:sp>
-          <p:nvSpPr>
-            <p:cNvPr id="16" name="Flowchart: Multidocument 15">
-              <a:extLst>
-                <a:ext uri="{FF2B5EF4-FFF2-40B4-BE49-F238E27FC236}">
-                  <a16:creationId xmlns:a16="http://schemas.microsoft.com/office/drawing/2014/main" id="{D2118656-0A31-48C4-97BB-2DCFBBD6926D}"/>
+                  <a16:creationId xmlns:a16="http://schemas.microsoft.com/office/drawing/2014/main" id="{5E9943A7-8BDB-4DA9-AC12-C76EC4C208DE}"/>
                 </a:ext>
               </a:extLst>
             </p:cNvPr>
@@ -7213,7 +7503,68 @@
           </p:nvSpPr>
           <p:spPr>
             <a:xfrm>
-              <a:off x="7401564" y="2443481"/>
+              <a:off x="5644033" y="1351652"/>
+              <a:ext cx="2147835" cy="910634"/>
+            </a:xfrm>
+            <a:prstGeom prst="flowChartMagneticDisk">
+              <a:avLst/>
+            </a:prstGeom>
+          </p:spPr>
+          <p:style>
+            <a:lnRef idx="2">
+              <a:schemeClr val="accent1">
+                <a:shade val="50000"/>
+              </a:schemeClr>
+            </a:lnRef>
+            <a:fillRef idx="1">
+              <a:schemeClr val="accent1"/>
+            </a:fillRef>
+            <a:effectRef idx="0">
+              <a:schemeClr val="accent1"/>
+            </a:effectRef>
+            <a:fontRef idx="minor">
+              <a:schemeClr val="lt1"/>
+            </a:fontRef>
+          </p:style>
+          <p:txBody>
+            <a:bodyPr rtlCol="0" anchor="ctr"/>
+            <a:lstStyle/>
+            <a:p>
+              <a:r>
+                <a:rPr lang="en-US" sz="1200" dirty="0" err="1">
+                  <a:cs typeface="Calibri"/>
+                </a:rPr>
+                <a:t>devel</a:t>
+              </a:r>
+              <a:br>
+                <a:rPr lang="en-US" sz="1200" dirty="0">
+                  <a:cs typeface="Calibri"/>
+                </a:rPr>
+              </a:br>
+              <a:r>
+                <a:rPr lang="en-US" sz="1200" dirty="0">
+                  <a:cs typeface="Calibri"/>
+                </a:rPr>
+                <a:t>container</a:t>
+              </a:r>
+            </a:p>
+          </p:txBody>
+        </p:sp>
+        <p:sp>
+          <p:nvSpPr>
+            <p:cNvPr id="21" name="Flowchart: Multidocument 20">
+              <a:extLst>
+                <a:ext uri="{FF2B5EF4-FFF2-40B4-BE49-F238E27FC236}">
+                  <a16:creationId xmlns:a16="http://schemas.microsoft.com/office/drawing/2014/main" id="{F3677709-4EB9-4825-9198-B108CDCBDC82}"/>
+                </a:ext>
+              </a:extLst>
+            </p:cNvPr>
+            <p:cNvSpPr/>
+            <p:nvPr/>
+          </p:nvSpPr>
+          <p:spPr>
+            <a:xfrm>
+              <a:off x="6390449" y="1714976"/>
               <a:ext cx="1274885" cy="489857"/>
             </a:xfrm>
             <a:prstGeom prst="flowChartMultidocument">
@@ -7285,442 +7636,33 @@
             </a:p>
           </p:txBody>
         </p:sp>
-        <p:grpSp>
-          <p:nvGrpSpPr>
-            <p:cNvPr id="19" name="Group 18">
+      </p:grpSp>
+      <p:grpSp>
+        <p:nvGrpSpPr>
+          <p:cNvPr id="22" name="Group 21">
+            <a:extLst>
+              <a:ext uri="{FF2B5EF4-FFF2-40B4-BE49-F238E27FC236}">
+                <a16:creationId xmlns:a16="http://schemas.microsoft.com/office/drawing/2014/main" id="{D48856B9-1130-4257-A8B5-F0C9E5736B22}"/>
+              </a:ext>
+            </a:extLst>
+          </p:cNvPr>
+          <p:cNvGrpSpPr/>
+          <p:nvPr/>
+        </p:nvGrpSpPr>
+        <p:grpSpPr>
+          <a:xfrm>
+            <a:off x="4211870" y="2692051"/>
+            <a:ext cx="2147835" cy="1103062"/>
+            <a:chOff x="5644033" y="1803828"/>
+            <a:chExt cx="2147835" cy="910634"/>
+          </a:xfrm>
+        </p:grpSpPr>
+        <p:sp>
+          <p:nvSpPr>
+            <p:cNvPr id="23" name="Flowchart: Magnetic Disk 22">
               <a:extLst>
                 <a:ext uri="{FF2B5EF4-FFF2-40B4-BE49-F238E27FC236}">
-                  <a16:creationId xmlns:a16="http://schemas.microsoft.com/office/drawing/2014/main" id="{16137C80-B678-4ED0-9B1B-D9B2C8E9AD27}"/>
-                </a:ext>
-              </a:extLst>
-            </p:cNvPr>
-            <p:cNvGrpSpPr/>
-            <p:nvPr/>
-          </p:nvGrpSpPr>
-          <p:grpSpPr>
-            <a:xfrm>
-              <a:off x="4187022" y="2136679"/>
-              <a:ext cx="2147835" cy="910634"/>
-              <a:chOff x="5644033" y="1351652"/>
-              <a:chExt cx="2147835" cy="910634"/>
-            </a:xfrm>
-          </p:grpSpPr>
-          <p:sp>
-            <p:nvSpPr>
-              <p:cNvPr id="20" name="Flowchart: Magnetic Disk 19">
-                <a:extLst>
-                  <a:ext uri="{FF2B5EF4-FFF2-40B4-BE49-F238E27FC236}">
-                    <a16:creationId xmlns:a16="http://schemas.microsoft.com/office/drawing/2014/main" id="{5E9943A7-8BDB-4DA9-AC12-C76EC4C208DE}"/>
-                  </a:ext>
-                </a:extLst>
-              </p:cNvPr>
-              <p:cNvSpPr/>
-              <p:nvPr/>
-            </p:nvSpPr>
-            <p:spPr>
-              <a:xfrm>
-                <a:off x="5644033" y="1351652"/>
-                <a:ext cx="2147835" cy="910634"/>
-              </a:xfrm>
-              <a:prstGeom prst="flowChartMagneticDisk">
-                <a:avLst/>
-              </a:prstGeom>
-            </p:spPr>
-            <p:style>
-              <a:lnRef idx="2">
-                <a:schemeClr val="accent1">
-                  <a:shade val="50000"/>
-                </a:schemeClr>
-              </a:lnRef>
-              <a:fillRef idx="1">
-                <a:schemeClr val="accent1"/>
-              </a:fillRef>
-              <a:effectRef idx="0">
-                <a:schemeClr val="accent1"/>
-              </a:effectRef>
-              <a:fontRef idx="minor">
-                <a:schemeClr val="lt1"/>
-              </a:fontRef>
-            </p:style>
-            <p:txBody>
-              <a:bodyPr rtlCol="0" anchor="ctr"/>
-              <a:lstStyle/>
-              <a:p>
-                <a:r>
-                  <a:rPr lang="en-US" sz="1200" dirty="0" err="1">
-                    <a:cs typeface="Calibri"/>
-                  </a:rPr>
-                  <a:t>devel</a:t>
-                </a:r>
-                <a:br>
-                  <a:rPr lang="en-US" sz="1200" dirty="0">
-                    <a:cs typeface="Calibri"/>
-                  </a:rPr>
-                </a:br>
-                <a:r>
-                  <a:rPr lang="en-US" sz="1200" dirty="0">
-                    <a:cs typeface="Calibri"/>
-                  </a:rPr>
-                  <a:t>container</a:t>
-                </a:r>
-              </a:p>
-            </p:txBody>
-          </p:sp>
-          <p:sp>
-            <p:nvSpPr>
-              <p:cNvPr id="21" name="Flowchart: Multidocument 20">
-                <a:extLst>
-                  <a:ext uri="{FF2B5EF4-FFF2-40B4-BE49-F238E27FC236}">
-                    <a16:creationId xmlns:a16="http://schemas.microsoft.com/office/drawing/2014/main" id="{F3677709-4EB9-4825-9198-B108CDCBDC82}"/>
-                  </a:ext>
-                </a:extLst>
-              </p:cNvPr>
-              <p:cNvSpPr/>
-              <p:nvPr/>
-            </p:nvSpPr>
-            <p:spPr>
-              <a:xfrm>
-                <a:off x="6390449" y="1714976"/>
-                <a:ext cx="1274885" cy="489857"/>
-              </a:xfrm>
-              <a:prstGeom prst="flowChartMultidocument">
-                <a:avLst/>
-              </a:prstGeom>
-            </p:spPr>
-            <p:style>
-              <a:lnRef idx="2">
-                <a:schemeClr val="accent1">
-                  <a:shade val="50000"/>
-                </a:schemeClr>
-              </a:lnRef>
-              <a:fillRef idx="1">
-                <a:schemeClr val="accent1"/>
-              </a:fillRef>
-              <a:effectRef idx="0">
-                <a:schemeClr val="accent1"/>
-              </a:effectRef>
-              <a:fontRef idx="minor">
-                <a:schemeClr val="lt1"/>
-              </a:fontRef>
-            </p:style>
-            <p:txBody>
-              <a:bodyPr rtlCol="0" anchor="ctr"/>
-              <a:lstStyle/>
-              <a:p>
-                <a:pPr algn="ctr"/>
-                <a:r>
-                  <a:rPr lang="en-US" sz="900" dirty="0">
-                    <a:cs typeface="Calibri"/>
-                  </a:rPr>
-                  <a:t>home</a:t>
-                </a:r>
-                <a:r>
-                  <a:rPr lang="en-US" sz="900" dirty="0">
-                    <a:ea typeface="+mn-lt"/>
-                    <a:cs typeface="+mn-lt"/>
-                  </a:rPr>
-                  <a:t>, </a:t>
-                </a:r>
-                <a:r>
-                  <a:rPr lang="en-US" sz="900" dirty="0" err="1">
-                    <a:ea typeface="+mn-lt"/>
-                    <a:cs typeface="+mn-lt"/>
-                  </a:rPr>
-                  <a:t>startscripts</a:t>
-                </a:r>
-                <a:r>
-                  <a:rPr lang="en-US" sz="900" dirty="0">
-                    <a:ea typeface="+mn-lt"/>
-                    <a:cs typeface="+mn-lt"/>
-                  </a:rPr>
-                  <a:t>,</a:t>
-                </a:r>
-                <a:br>
-                  <a:rPr lang="en-US" sz="900" dirty="0">
-                    <a:cs typeface="+mn-lt"/>
-                  </a:rPr>
-                </a:br>
-                <a:r>
-                  <a:rPr lang="en-US" sz="900" dirty="0">
-                    <a:cs typeface="Calibri"/>
-                  </a:rPr>
-                  <a:t>workspace</a:t>
-                </a:r>
-                <a:endParaRPr lang="en-US" sz="900">
-                  <a:cs typeface="Calibri"/>
-                </a:endParaRPr>
-              </a:p>
-            </p:txBody>
-          </p:sp>
-        </p:grpSp>
-        <p:grpSp>
-          <p:nvGrpSpPr>
-            <p:cNvPr id="22" name="Group 21">
-              <a:extLst>
-                <a:ext uri="{FF2B5EF4-FFF2-40B4-BE49-F238E27FC236}">
-                  <a16:creationId xmlns:a16="http://schemas.microsoft.com/office/drawing/2014/main" id="{D48856B9-1130-4257-A8B5-F0C9E5736B22}"/>
-                </a:ext>
-              </a:extLst>
-            </p:cNvPr>
-            <p:cNvGrpSpPr/>
-            <p:nvPr/>
-          </p:nvGrpSpPr>
-          <p:grpSpPr>
-            <a:xfrm>
-              <a:off x="4187022" y="3524608"/>
-              <a:ext cx="2147835" cy="910634"/>
-              <a:chOff x="5644033" y="1803828"/>
-              <a:chExt cx="2147835" cy="910634"/>
-            </a:xfrm>
-          </p:grpSpPr>
-          <p:sp>
-            <p:nvSpPr>
-              <p:cNvPr id="23" name="Flowchart: Magnetic Disk 22">
-                <a:extLst>
-                  <a:ext uri="{FF2B5EF4-FFF2-40B4-BE49-F238E27FC236}">
-                    <a16:creationId xmlns:a16="http://schemas.microsoft.com/office/drawing/2014/main" id="{40895FEB-5754-4934-8229-8AADF904F9F4}"/>
-                  </a:ext>
-                </a:extLst>
-              </p:cNvPr>
-              <p:cNvSpPr/>
-              <p:nvPr/>
-            </p:nvSpPr>
-            <p:spPr>
-              <a:xfrm>
-                <a:off x="5644033" y="1803828"/>
-                <a:ext cx="2147835" cy="910634"/>
-              </a:xfrm>
-              <a:prstGeom prst="flowChartMagneticDisk">
-                <a:avLst/>
-              </a:prstGeom>
-            </p:spPr>
-            <p:style>
-              <a:lnRef idx="2">
-                <a:schemeClr val="accent1">
-                  <a:shade val="50000"/>
-                </a:schemeClr>
-              </a:lnRef>
-              <a:fillRef idx="1">
-                <a:schemeClr val="accent1"/>
-              </a:fillRef>
-              <a:effectRef idx="0">
-                <a:schemeClr val="accent1"/>
-              </a:effectRef>
-              <a:fontRef idx="minor">
-                <a:schemeClr val="lt1"/>
-              </a:fontRef>
-            </p:style>
-            <p:txBody>
-              <a:bodyPr rtlCol="0" anchor="ctr"/>
-              <a:lstStyle/>
-              <a:p>
-                <a:r>
-                  <a:rPr lang="en-US" sz="1200" dirty="0">
-                    <a:cs typeface="Calibri"/>
-                  </a:rPr>
-                  <a:t>release</a:t>
-                </a:r>
-                <a:br>
-                  <a:rPr lang="en-US" sz="1200" dirty="0">
-                    <a:cs typeface="Calibri"/>
-                  </a:rPr>
-                </a:br>
-                <a:r>
-                  <a:rPr lang="en-US" sz="1200" dirty="0">
-                    <a:cs typeface="Calibri"/>
-                  </a:rPr>
-                  <a:t>container</a:t>
-                </a:r>
-              </a:p>
-            </p:txBody>
-          </p:sp>
-          <p:sp>
-            <p:nvSpPr>
-              <p:cNvPr id="24" name="Flowchart: Multidocument 23">
-                <a:extLst>
-                  <a:ext uri="{FF2B5EF4-FFF2-40B4-BE49-F238E27FC236}">
-                    <a16:creationId xmlns:a16="http://schemas.microsoft.com/office/drawing/2014/main" id="{BA5EF1BB-43B7-4CEE-AD41-2F091858BC27}"/>
-                  </a:ext>
-                </a:extLst>
-              </p:cNvPr>
-              <p:cNvSpPr/>
-              <p:nvPr/>
-            </p:nvSpPr>
-            <p:spPr>
-              <a:xfrm>
-                <a:off x="6390449" y="2167152"/>
-                <a:ext cx="1274885" cy="489857"/>
-              </a:xfrm>
-              <a:prstGeom prst="flowChartMultidocument">
-                <a:avLst/>
-              </a:prstGeom>
-            </p:spPr>
-            <p:style>
-              <a:lnRef idx="2">
-                <a:schemeClr val="accent1">
-                  <a:shade val="50000"/>
-                </a:schemeClr>
-              </a:lnRef>
-              <a:fillRef idx="1">
-                <a:schemeClr val="accent1"/>
-              </a:fillRef>
-              <a:effectRef idx="0">
-                <a:schemeClr val="accent1"/>
-              </a:effectRef>
-              <a:fontRef idx="minor">
-                <a:schemeClr val="lt1"/>
-              </a:fontRef>
-            </p:style>
-            <p:txBody>
-              <a:bodyPr rtlCol="0" anchor="ctr"/>
-              <a:lstStyle/>
-              <a:p>
-                <a:pPr algn="ctr"/>
-                <a:r>
-                  <a:rPr lang="en-US" sz="900" dirty="0">
-                    <a:cs typeface="Calibri"/>
-                  </a:rPr>
-                  <a:t>home</a:t>
-                </a:r>
-                <a:r>
-                  <a:rPr lang="en-US" sz="900" dirty="0">
-                    <a:ea typeface="+mn-lt"/>
-                    <a:cs typeface="+mn-lt"/>
-                  </a:rPr>
-                  <a:t>, </a:t>
-                </a:r>
-                <a:r>
-                  <a:rPr lang="en-US" sz="900" dirty="0" err="1">
-                    <a:ea typeface="+mn-lt"/>
-                    <a:cs typeface="+mn-lt"/>
-                  </a:rPr>
-                  <a:t>startscripts</a:t>
-                </a:r>
-                <a:r>
-                  <a:rPr lang="en-US" sz="900" dirty="0">
-                    <a:ea typeface="+mn-lt"/>
-                    <a:cs typeface="+mn-lt"/>
-                  </a:rPr>
-                  <a:t>,</a:t>
-                </a:r>
-                <a:br>
-                  <a:rPr lang="en-US" sz="900" dirty="0">
-                    <a:cs typeface="+mn-lt"/>
-                  </a:rPr>
-                </a:br>
-                <a:r>
-                  <a:rPr lang="en-US" sz="900" dirty="0">
-                    <a:cs typeface="Calibri"/>
-                  </a:rPr>
-                  <a:t>workspace</a:t>
-                </a:r>
-              </a:p>
-            </p:txBody>
-          </p:sp>
-        </p:grpSp>
-        <p:sp>
-          <p:nvSpPr>
-            <p:cNvPr id="25" name="TextBox 24">
-              <a:extLst>
-                <a:ext uri="{FF2B5EF4-FFF2-40B4-BE49-F238E27FC236}">
-                  <a16:creationId xmlns:a16="http://schemas.microsoft.com/office/drawing/2014/main" id="{AE8BD7A8-A196-4C3A-8054-7AA955BD8D93}"/>
-                </a:ext>
-              </a:extLst>
-            </p:cNvPr>
-            <p:cNvSpPr txBox="1"/>
-            <p:nvPr/>
-          </p:nvSpPr>
-          <p:spPr>
-            <a:xfrm>
-              <a:off x="7279402" y="1165609"/>
-              <a:ext cx="1512278" cy="923330"/>
-            </a:xfrm>
-            <a:prstGeom prst="rect">
-              <a:avLst/>
-            </a:prstGeom>
-            <a:noFill/>
-          </p:spPr>
-          <p:txBody>
-            <a:bodyPr rot="0" spcFirstLastPara="0" vertOverflow="overflow" horzOverflow="overflow" vert="horz" wrap="square" lIns="91440" tIns="45720" rIns="91440" bIns="45720" numCol="1" spcCol="0" rtlCol="0" fromWordArt="0" anchor="t" anchorCtr="0" forceAA="0" compatLnSpc="1">
-              <a:prstTxWarp prst="textNoShape">
-                <a:avLst/>
-              </a:prstTxWarp>
-              <a:spAutoFit/>
-            </a:bodyPr>
-            <a:lstStyle/>
-            <a:p>
-              <a:pPr algn="ctr"/>
-              <a:r>
-                <a:rPr lang="en-US" dirty="0">
-                  <a:solidFill>
-                    <a:schemeClr val="bg1"/>
-                  </a:solidFill>
-                  <a:ea typeface="+mn-lt"/>
-                  <a:cs typeface="+mn-lt"/>
-                </a:rPr>
-                <a:t>Host system</a:t>
-              </a:r>
-              <a:br>
-                <a:rPr lang="en-US" dirty="0">
-                  <a:ea typeface="+mn-lt"/>
-                  <a:cs typeface="+mn-lt"/>
-                </a:rPr>
-              </a:br>
-              <a:r>
-                <a:rPr lang="en-US" sz="1200" dirty="0">
-                  <a:solidFill>
-                    <a:schemeClr val="bg1"/>
-                  </a:solidFill>
-                  <a:ea typeface="+mn-lt"/>
-                  <a:cs typeface="+mn-lt"/>
-                </a:rPr>
-                <a:t>cloned</a:t>
-              </a:r>
-              <a:br>
-                <a:rPr lang="en-US" sz="1200" dirty="0">
-                  <a:solidFill>
-                    <a:schemeClr val="bg1"/>
-                  </a:solidFill>
-                  <a:ea typeface="+mn-lt"/>
-                  <a:cs typeface="+mn-lt"/>
-                </a:rPr>
-              </a:br>
-              <a:r>
-                <a:rPr lang="en-US" sz="1200" dirty="0" err="1">
-                  <a:solidFill>
-                    <a:schemeClr val="bg1"/>
-                  </a:solidFill>
-                  <a:ea typeface="+mn-lt"/>
-                  <a:cs typeface="+mn-lt"/>
-                </a:rPr>
-                <a:t>docker_development</a:t>
-              </a:r>
-              <a:r>
-                <a:rPr lang="en-US" sz="1200" dirty="0">
-                  <a:solidFill>
-                    <a:schemeClr val="bg1"/>
-                  </a:solidFill>
-                  <a:ea typeface="+mn-lt"/>
-                  <a:cs typeface="+mn-lt"/>
-                </a:rPr>
-                <a:t> git repo</a:t>
-              </a:r>
-              <a:endParaRPr lang="en-US" sz="1200">
-                <a:solidFill>
-                  <a:schemeClr val="bg1"/>
-                </a:solidFill>
-                <a:ea typeface="+mn-lt"/>
-                <a:cs typeface="+mn-lt"/>
-              </a:endParaRPr>
-            </a:p>
-          </p:txBody>
-        </p:sp>
-        <p:sp>
-          <p:nvSpPr>
-            <p:cNvPr id="27" name="Arrow: Left-Right 26">
-              <a:extLst>
-                <a:ext uri="{FF2B5EF4-FFF2-40B4-BE49-F238E27FC236}">
-                  <a16:creationId xmlns:a16="http://schemas.microsoft.com/office/drawing/2014/main" id="{35B5C3CB-1A8B-48BC-AEF7-0A0B019753A2}"/>
+                  <a16:creationId xmlns:a16="http://schemas.microsoft.com/office/drawing/2014/main" id="{40895FEB-5754-4934-8229-8AADF904F9F4}"/>
                 </a:ext>
               </a:extLst>
             </p:cNvPr>
@@ -7728,11 +7670,73 @@
             <p:nvPr/>
           </p:nvSpPr>
           <p:spPr>
-            <a:xfrm rot="1680000">
-              <a:off x="6175221" y="1829705"/>
-              <a:ext cx="1350245" cy="483576"/>
+            <a:xfrm>
+              <a:off x="5644033" y="1803828"/>
+              <a:ext cx="2147835" cy="910634"/>
             </a:xfrm>
-            <a:prstGeom prst="leftRightArrow">
+            <a:prstGeom prst="flowChartMagneticDisk">
+              <a:avLst/>
+            </a:prstGeom>
+          </p:spPr>
+          <p:style>
+            <a:lnRef idx="2">
+              <a:schemeClr val="accent1">
+                <a:shade val="50000"/>
+              </a:schemeClr>
+            </a:lnRef>
+            <a:fillRef idx="1">
+              <a:schemeClr val="accent1"/>
+            </a:fillRef>
+            <a:effectRef idx="0">
+              <a:schemeClr val="accent1"/>
+            </a:effectRef>
+            <a:fontRef idx="minor">
+              <a:schemeClr val="lt1"/>
+            </a:fontRef>
+          </p:style>
+          <p:txBody>
+            <a:bodyPr lIns="91440" tIns="45720" rIns="91440" bIns="45720" rtlCol="0" anchor="ctr"/>
+            <a:lstStyle/>
+            <a:p>
+              <a:r>
+                <a:rPr lang="en-US" sz="1200" dirty="0">
+                  <a:cs typeface="Calibri"/>
+                </a:rPr>
+                <a:t>frozen</a:t>
+              </a:r>
+              <a:br>
+                <a:rPr lang="en-US" sz="1200" dirty="0">
+                  <a:cs typeface="Calibri"/>
+                </a:rPr>
+              </a:br>
+              <a:r>
+                <a:rPr lang="en-US" sz="1200" dirty="0">
+                  <a:cs typeface="Calibri"/>
+                </a:rPr>
+                <a:t>container</a:t>
+              </a:r>
+              <a:endParaRPr lang="de-DE" dirty="0"/>
+            </a:p>
+          </p:txBody>
+        </p:sp>
+        <p:sp>
+          <p:nvSpPr>
+            <p:cNvPr id="24" name="Flowchart: Multidocument 23">
+              <a:extLst>
+                <a:ext uri="{FF2B5EF4-FFF2-40B4-BE49-F238E27FC236}">
+                  <a16:creationId xmlns:a16="http://schemas.microsoft.com/office/drawing/2014/main" id="{BA5EF1BB-43B7-4CEE-AD41-2F091858BC27}"/>
+                </a:ext>
+              </a:extLst>
+            </p:cNvPr>
+            <p:cNvSpPr/>
+            <p:nvPr/>
+          </p:nvSpPr>
+          <p:spPr>
+            <a:xfrm>
+              <a:off x="6390449" y="2167152"/>
+              <a:ext cx="1274885" cy="489857"/>
+            </a:xfrm>
+            <a:prstGeom prst="flowChartMultidocument">
               <a:avLst/>
             </a:prstGeom>
           </p:spPr>
@@ -7758,23 +7762,306 @@
             <a:p>
               <a:pPr algn="ctr"/>
               <a:r>
-                <a:rPr lang="en-US" sz="1100" dirty="0">
+                <a:rPr lang="en-US" sz="900" dirty="0">
                   <a:cs typeface="Calibri"/>
                 </a:rPr>
-                <a:t>mounted</a:t>
+                <a:t>home</a:t>
               </a:r>
-              <a:endParaRPr lang="en-US" sz="1400" dirty="0">
-                <a:cs typeface="Calibri"/>
-              </a:endParaRPr>
+              <a:r>
+                <a:rPr lang="en-US" sz="900" dirty="0">
+                  <a:ea typeface="+mn-lt"/>
+                  <a:cs typeface="+mn-lt"/>
+                </a:rPr>
+                <a:t>, </a:t>
+              </a:r>
+              <a:r>
+                <a:rPr lang="en-US" sz="900" dirty="0" err="1">
+                  <a:ea typeface="+mn-lt"/>
+                  <a:cs typeface="+mn-lt"/>
+                </a:rPr>
+                <a:t>startscripts</a:t>
+              </a:r>
+              <a:r>
+                <a:rPr lang="en-US" sz="900" dirty="0">
+                  <a:ea typeface="+mn-lt"/>
+                  <a:cs typeface="+mn-lt"/>
+                </a:rPr>
+                <a:t>,</a:t>
+              </a:r>
+              <a:br>
+                <a:rPr lang="en-US" sz="900" dirty="0">
+                  <a:cs typeface="+mn-lt"/>
+                </a:rPr>
+              </a:br>
+              <a:r>
+                <a:rPr lang="en-US" sz="900" dirty="0">
+                  <a:cs typeface="Calibri"/>
+                </a:rPr>
+                <a:t>workspace</a:t>
+              </a:r>
             </a:p>
           </p:txBody>
         </p:sp>
+      </p:grpSp>
+      <p:sp>
+        <p:nvSpPr>
+          <p:cNvPr id="25" name="TextBox 24">
+            <a:extLst>
+              <a:ext uri="{FF2B5EF4-FFF2-40B4-BE49-F238E27FC236}">
+                <a16:creationId xmlns:a16="http://schemas.microsoft.com/office/drawing/2014/main" id="{AE8BD7A8-A196-4C3A-8054-7AA955BD8D93}"/>
+              </a:ext>
+            </a:extLst>
+          </p:cNvPr>
+          <p:cNvSpPr txBox="1"/>
+          <p:nvPr/>
+        </p:nvSpPr>
+        <p:spPr>
+          <a:xfrm>
+            <a:off x="7304250" y="555152"/>
+            <a:ext cx="1512278" cy="1118441"/>
+          </a:xfrm>
+          <a:prstGeom prst="rect">
+            <a:avLst/>
+          </a:prstGeom>
+          <a:noFill/>
+        </p:spPr>
+        <p:txBody>
+          <a:bodyPr rot="0" spcFirstLastPara="0" vertOverflow="overflow" horzOverflow="overflow" vert="horz" wrap="square" lIns="91440" tIns="45720" rIns="91440" bIns="45720" numCol="1" spcCol="0" rtlCol="0" fromWordArt="0" anchor="t" anchorCtr="0" forceAA="0" compatLnSpc="1">
+            <a:prstTxWarp prst="textNoShape">
+              <a:avLst/>
+            </a:prstTxWarp>
+            <a:spAutoFit/>
+          </a:bodyPr>
+          <a:lstStyle/>
+          <a:p>
+            <a:pPr algn="ctr"/>
+            <a:r>
+              <a:rPr lang="en-US" dirty="0">
+                <a:solidFill>
+                  <a:schemeClr val="bg1"/>
+                </a:solidFill>
+                <a:ea typeface="+mn-lt"/>
+                <a:cs typeface="+mn-lt"/>
+              </a:rPr>
+              <a:t>Host system</a:t>
+            </a:r>
+            <a:br>
+              <a:rPr lang="en-US" dirty="0">
+                <a:ea typeface="+mn-lt"/>
+                <a:cs typeface="+mn-lt"/>
+              </a:rPr>
+            </a:br>
+            <a:r>
+              <a:rPr lang="en-US" sz="1200" dirty="0">
+                <a:solidFill>
+                  <a:schemeClr val="bg1"/>
+                </a:solidFill>
+                <a:ea typeface="+mn-lt"/>
+                <a:cs typeface="+mn-lt"/>
+              </a:rPr>
+              <a:t>cloned</a:t>
+            </a:r>
+            <a:br>
+              <a:rPr lang="en-US" sz="1200" dirty="0">
+                <a:solidFill>
+                  <a:schemeClr val="bg1"/>
+                </a:solidFill>
+                <a:ea typeface="+mn-lt"/>
+                <a:cs typeface="+mn-lt"/>
+              </a:rPr>
+            </a:br>
+            <a:r>
+              <a:rPr lang="en-US" sz="1200" dirty="0" err="1">
+                <a:solidFill>
+                  <a:schemeClr val="bg1"/>
+                </a:solidFill>
+                <a:ea typeface="+mn-lt"/>
+                <a:cs typeface="+mn-lt"/>
+              </a:rPr>
+              <a:t>docker_development</a:t>
+            </a:r>
+            <a:r>
+              <a:rPr lang="en-US" sz="1200" dirty="0">
+                <a:solidFill>
+                  <a:schemeClr val="bg1"/>
+                </a:solidFill>
+                <a:ea typeface="+mn-lt"/>
+                <a:cs typeface="+mn-lt"/>
+              </a:rPr>
+              <a:t> git repo</a:t>
+            </a:r>
+            <a:endParaRPr lang="en-US" sz="1200">
+              <a:solidFill>
+                <a:schemeClr val="bg1"/>
+              </a:solidFill>
+              <a:ea typeface="+mn-lt"/>
+              <a:cs typeface="+mn-lt"/>
+            </a:endParaRPr>
+          </a:p>
+        </p:txBody>
+      </p:sp>
+      <p:sp>
+        <p:nvSpPr>
+          <p:cNvPr id="27" name="Arrow: Left-Right 26">
+            <a:extLst>
+              <a:ext uri="{FF2B5EF4-FFF2-40B4-BE49-F238E27FC236}">
+                <a16:creationId xmlns:a16="http://schemas.microsoft.com/office/drawing/2014/main" id="{35B5C3CB-1A8B-48BC-AEF7-0A0B019753A2}"/>
+              </a:ext>
+            </a:extLst>
+          </p:cNvPr>
+          <p:cNvSpPr/>
+          <p:nvPr/>
+        </p:nvSpPr>
+        <p:spPr>
+          <a:xfrm rot="1680000">
+            <a:off x="6200069" y="1003428"/>
+            <a:ext cx="1350245" cy="585762"/>
+          </a:xfrm>
+          <a:prstGeom prst="leftRightArrow">
+            <a:avLst/>
+          </a:prstGeom>
+        </p:spPr>
+        <p:style>
+          <a:lnRef idx="2">
+            <a:schemeClr val="accent1">
+              <a:shade val="50000"/>
+            </a:schemeClr>
+          </a:lnRef>
+          <a:fillRef idx="1">
+            <a:schemeClr val="accent1"/>
+          </a:fillRef>
+          <a:effectRef idx="0">
+            <a:schemeClr val="accent1"/>
+          </a:effectRef>
+          <a:fontRef idx="minor">
+            <a:schemeClr val="lt1"/>
+          </a:fontRef>
+        </p:style>
+        <p:txBody>
+          <a:bodyPr rtlCol="0" anchor="ctr"/>
+          <a:lstStyle/>
+          <a:p>
+            <a:pPr algn="ctr"/>
+            <a:r>
+              <a:rPr lang="en-US" sz="1100" dirty="0">
+                <a:cs typeface="Calibri"/>
+              </a:rPr>
+              <a:t>mounted</a:t>
+            </a:r>
+            <a:endParaRPr lang="en-US" sz="1400" dirty="0">
+              <a:cs typeface="Calibri"/>
+            </a:endParaRPr>
+          </a:p>
+        </p:txBody>
+      </p:sp>
+      <p:sp>
+        <p:nvSpPr>
+          <p:cNvPr id="28" name="Arrow: Left-Right 27">
+            <a:extLst>
+              <a:ext uri="{FF2B5EF4-FFF2-40B4-BE49-F238E27FC236}">
+                <a16:creationId xmlns:a16="http://schemas.microsoft.com/office/drawing/2014/main" id="{F3CC9922-E1E6-4904-A22F-857D5E57479B}"/>
+              </a:ext>
+            </a:extLst>
+          </p:cNvPr>
+          <p:cNvSpPr/>
+          <p:nvPr/>
+        </p:nvSpPr>
+        <p:spPr>
+          <a:xfrm>
+            <a:off x="6249652" y="1707650"/>
+            <a:ext cx="1130439" cy="585762"/>
+          </a:xfrm>
+          <a:prstGeom prst="leftRightArrow">
+            <a:avLst/>
+          </a:prstGeom>
+        </p:spPr>
+        <p:style>
+          <a:lnRef idx="2">
+            <a:schemeClr val="accent1">
+              <a:shade val="50000"/>
+            </a:schemeClr>
+          </a:lnRef>
+          <a:fillRef idx="1">
+            <a:schemeClr val="accent1"/>
+          </a:fillRef>
+          <a:effectRef idx="0">
+            <a:schemeClr val="accent1"/>
+          </a:effectRef>
+          <a:fontRef idx="minor">
+            <a:schemeClr val="lt1"/>
+          </a:fontRef>
+        </p:style>
+        <p:txBody>
+          <a:bodyPr rtlCol="0" anchor="ctr"/>
+          <a:lstStyle/>
+          <a:p>
+            <a:pPr algn="ctr"/>
+            <a:r>
+              <a:rPr lang="en-US" sz="1100" dirty="0">
+                <a:cs typeface="Calibri"/>
+              </a:rPr>
+              <a:t>mounted</a:t>
+            </a:r>
+            <a:endParaRPr lang="en-US" sz="1400" dirty="0">
+              <a:cs typeface="Calibri"/>
+            </a:endParaRPr>
+          </a:p>
+        </p:txBody>
+      </p:sp>
+      <p:graphicFrame>
+        <p:nvGraphicFramePr>
+          <p:cNvPr id="52" name="Diagram 52">
+            <a:extLst>
+              <a:ext uri="{FF2B5EF4-FFF2-40B4-BE49-F238E27FC236}">
+                <a16:creationId xmlns:a16="http://schemas.microsoft.com/office/drawing/2014/main" id="{C78CFD2E-E101-4666-A33A-5C36FCC7C64D}"/>
+              </a:ext>
+            </a:extLst>
+          </p:cNvPr>
+          <p:cNvGraphicFramePr/>
+          <p:nvPr>
+            <p:extLst>
+              <p:ext uri="{D42A27DB-BD31-4B8C-83A1-F6EECF244321}">
+                <p14:modId xmlns:p14="http://schemas.microsoft.com/office/powerpoint/2010/main" val="1585564854"/>
+              </p:ext>
+            </p:extLst>
+          </p:nvPr>
+        </p:nvGraphicFramePr>
+        <p:xfrm>
+          <a:off x="294897" y="400725"/>
+          <a:ext cx="2267158" cy="4377245"/>
+        </p:xfrm>
+        <a:graphic>
+          <a:graphicData uri="http://schemas.openxmlformats.org/drawingml/2006/diagram">
+            <dgm:relIds xmlns:dgm="http://schemas.openxmlformats.org/drawingml/2006/diagram" xmlns:r="http://schemas.openxmlformats.org/officeDocument/2006/relationships" r:dm="rId2" r:lo="rId3" r:qs="rId4" r:cs="rId5"/>
+          </a:graphicData>
+        </a:graphic>
+      </p:graphicFrame>
+      <p:grpSp>
+        <p:nvGrpSpPr>
+          <p:cNvPr id="2847" name="Group 2846">
+            <a:extLst>
+              <a:ext uri="{FF2B5EF4-FFF2-40B4-BE49-F238E27FC236}">
+                <a16:creationId xmlns:a16="http://schemas.microsoft.com/office/drawing/2014/main" id="{31043F8F-DE1A-4BDD-92A1-976DB015493E}"/>
+              </a:ext>
+            </a:extLst>
+          </p:cNvPr>
+          <p:cNvGrpSpPr/>
+          <p:nvPr/>
+        </p:nvGrpSpPr>
+        <p:grpSpPr>
+          <a:xfrm>
+            <a:off x="2562684" y="357941"/>
+            <a:ext cx="1493438" cy="4360753"/>
+            <a:chOff x="2267786" y="946279"/>
+            <a:chExt cx="1493438" cy="3600023"/>
+          </a:xfrm>
+        </p:grpSpPr>
         <p:sp>
           <p:nvSpPr>
-            <p:cNvPr id="28" name="Arrow: Left-Right 27">
+            <p:cNvPr id="4" name="Cylinder 3">
               <a:extLst>
                 <a:ext uri="{FF2B5EF4-FFF2-40B4-BE49-F238E27FC236}">
-                  <a16:creationId xmlns:a16="http://schemas.microsoft.com/office/drawing/2014/main" id="{F3CC9922-E1E6-4904-A22F-857D5E57479B}"/>
+                  <a16:creationId xmlns:a16="http://schemas.microsoft.com/office/drawing/2014/main" id="{18DD19DD-C324-46DB-B75F-F85AC43C876E}"/>
                 </a:ext>
               </a:extLst>
             </p:cNvPr>
@@ -7783,10 +8070,56 @@
           </p:nvSpPr>
           <p:spPr>
             <a:xfrm>
-              <a:off x="6224804" y="2411076"/>
-              <a:ext cx="1130439" cy="483576"/>
+              <a:off x="2400299" y="946279"/>
+              <a:ext cx="1205802" cy="3600023"/>
             </a:xfrm>
-            <a:prstGeom prst="leftRightArrow">
+            <a:prstGeom prst="can">
+              <a:avLst/>
+            </a:prstGeom>
+          </p:spPr>
+          <p:style>
+            <a:lnRef idx="2">
+              <a:schemeClr val="accent1">
+                <a:shade val="50000"/>
+              </a:schemeClr>
+            </a:lnRef>
+            <a:fillRef idx="1">
+              <a:schemeClr val="accent1"/>
+            </a:fillRef>
+            <a:effectRef idx="0">
+              <a:schemeClr val="accent1"/>
+            </a:effectRef>
+            <a:fontRef idx="minor">
+              <a:schemeClr val="lt1"/>
+            </a:fontRef>
+          </p:style>
+          <p:txBody>
+            <a:bodyPr rtlCol="0" anchor="ctr"/>
+            <a:lstStyle/>
+            <a:p>
+              <a:pPr algn="ctr"/>
+              <a:endParaRPr lang="en-US"/>
+            </a:p>
+          </p:txBody>
+        </p:sp>
+        <p:sp>
+          <p:nvSpPr>
+            <p:cNvPr id="6" name="Flowchart: Magnetic Disk 5">
+              <a:extLst>
+                <a:ext uri="{FF2B5EF4-FFF2-40B4-BE49-F238E27FC236}">
+                  <a16:creationId xmlns:a16="http://schemas.microsoft.com/office/drawing/2014/main" id="{293F8109-D0ED-473E-8448-E1262DCAC0D3}"/>
+                </a:ext>
+              </a:extLst>
+            </p:cNvPr>
+            <p:cNvSpPr/>
+            <p:nvPr/>
+          </p:nvSpPr>
+          <p:spPr>
+            <a:xfrm>
+              <a:off x="2541605" y="1326532"/>
+              <a:ext cx="916912" cy="615461"/>
+            </a:xfrm>
+            <a:prstGeom prst="flowChartMagneticDisk">
               <a:avLst/>
             </a:prstGeom>
           </p:spPr>
@@ -7812,377 +8145,21 @@
             <a:p>
               <a:pPr algn="ctr"/>
               <a:r>
-                <a:rPr lang="en-US" sz="1100" dirty="0">
+                <a:rPr lang="en-US" dirty="0">
                   <a:cs typeface="Calibri"/>
                 </a:rPr>
-                <a:t>mounted</a:t>
+                <a:t>base</a:t>
               </a:r>
-              <a:endParaRPr lang="en-US" sz="1400" dirty="0">
-                <a:cs typeface="Calibri"/>
-              </a:endParaRPr>
+              <a:endParaRPr lang="en-US" dirty="0"/>
             </a:p>
           </p:txBody>
         </p:sp>
-        <p:graphicFrame>
-          <p:nvGraphicFramePr>
-            <p:cNvPr id="52" name="Diagram 52">
+        <p:sp>
+          <p:nvSpPr>
+            <p:cNvPr id="7" name="Flowchart: Magnetic Disk 6">
               <a:extLst>
                 <a:ext uri="{FF2B5EF4-FFF2-40B4-BE49-F238E27FC236}">
-                  <a16:creationId xmlns:a16="http://schemas.microsoft.com/office/drawing/2014/main" id="{C78CFD2E-E101-4666-A33A-5C36FCC7C64D}"/>
-                </a:ext>
-              </a:extLst>
-            </p:cNvPr>
-            <p:cNvGraphicFramePr/>
-            <p:nvPr>
-              <p:extLst>
-                <p:ext uri="{D42A27DB-BD31-4B8C-83A1-F6EECF244321}">
-                  <p14:modId xmlns:p14="http://schemas.microsoft.com/office/powerpoint/2010/main" val="1585564854"/>
-                </p:ext>
-              </p:extLst>
-            </p:nvPr>
-          </p:nvGraphicFramePr>
-          <p:xfrm>
-            <a:off x="270049" y="1038121"/>
-            <a:ext cx="2267158" cy="3613638"/>
-          </p:xfrm>
-          <a:graphic>
-            <a:graphicData uri="http://schemas.openxmlformats.org/drawingml/2006/diagram">
-              <dgm:relIds xmlns:dgm="http://schemas.openxmlformats.org/drawingml/2006/diagram" xmlns:r="http://schemas.openxmlformats.org/officeDocument/2006/relationships" r:dm="rId2" r:lo="rId3" r:qs="rId4" r:cs="rId5"/>
-            </a:graphicData>
-          </a:graphic>
-        </p:graphicFrame>
-        <p:grpSp>
-          <p:nvGrpSpPr>
-            <p:cNvPr id="2847" name="Group 2846">
-              <a:extLst>
-                <a:ext uri="{FF2B5EF4-FFF2-40B4-BE49-F238E27FC236}">
-                  <a16:creationId xmlns:a16="http://schemas.microsoft.com/office/drawing/2014/main" id="{31043F8F-DE1A-4BDD-92A1-976DB015493E}"/>
-                </a:ext>
-              </a:extLst>
-            </p:cNvPr>
-            <p:cNvGrpSpPr/>
-            <p:nvPr/>
-          </p:nvGrpSpPr>
-          <p:grpSpPr>
-            <a:xfrm>
-              <a:off x="2537836" y="1002801"/>
-              <a:ext cx="1493438" cy="3512363"/>
-              <a:chOff x="2267786" y="946279"/>
-              <a:chExt cx="1493438" cy="3512363"/>
-            </a:xfrm>
-          </p:grpSpPr>
-          <p:sp>
-            <p:nvSpPr>
-              <p:cNvPr id="4" name="Cylinder 3">
-                <a:extLst>
-                  <a:ext uri="{FF2B5EF4-FFF2-40B4-BE49-F238E27FC236}">
-                    <a16:creationId xmlns:a16="http://schemas.microsoft.com/office/drawing/2014/main" id="{18DD19DD-C324-46DB-B75F-F85AC43C876E}"/>
-                  </a:ext>
-                </a:extLst>
-              </p:cNvPr>
-              <p:cNvSpPr/>
-              <p:nvPr/>
-            </p:nvSpPr>
-            <p:spPr>
-              <a:xfrm>
-                <a:off x="2400299" y="946279"/>
-                <a:ext cx="1205802" cy="2888901"/>
-              </a:xfrm>
-              <a:prstGeom prst="can">
-                <a:avLst/>
-              </a:prstGeom>
-            </p:spPr>
-            <p:style>
-              <a:lnRef idx="2">
-                <a:schemeClr val="accent1">
-                  <a:shade val="50000"/>
-                </a:schemeClr>
-              </a:lnRef>
-              <a:fillRef idx="1">
-                <a:schemeClr val="accent1"/>
-              </a:fillRef>
-              <a:effectRef idx="0">
-                <a:schemeClr val="accent1"/>
-              </a:effectRef>
-              <a:fontRef idx="minor">
-                <a:schemeClr val="lt1"/>
-              </a:fontRef>
-            </p:style>
-            <p:txBody>
-              <a:bodyPr rtlCol="0" anchor="ctr"/>
-              <a:lstStyle/>
-              <a:p>
-                <a:pPr algn="ctr"/>
-                <a:endParaRPr lang="en-US"/>
-              </a:p>
-            </p:txBody>
-          </p:sp>
-          <p:sp>
-            <p:nvSpPr>
-              <p:cNvPr id="6" name="Flowchart: Magnetic Disk 5">
-                <a:extLst>
-                  <a:ext uri="{FF2B5EF4-FFF2-40B4-BE49-F238E27FC236}">
-                    <a16:creationId xmlns:a16="http://schemas.microsoft.com/office/drawing/2014/main" id="{293F8109-D0ED-473E-8448-E1262DCAC0D3}"/>
-                  </a:ext>
-                </a:extLst>
-              </p:cNvPr>
-              <p:cNvSpPr/>
-              <p:nvPr/>
-            </p:nvSpPr>
-            <p:spPr>
-              <a:xfrm>
-                <a:off x="2541605" y="1326532"/>
-                <a:ext cx="916912" cy="615461"/>
-              </a:xfrm>
-              <a:prstGeom prst="flowChartMagneticDisk">
-                <a:avLst/>
-              </a:prstGeom>
-            </p:spPr>
-            <p:style>
-              <a:lnRef idx="2">
-                <a:schemeClr val="accent1">
-                  <a:shade val="50000"/>
-                </a:schemeClr>
-              </a:lnRef>
-              <a:fillRef idx="1">
-                <a:schemeClr val="accent1"/>
-              </a:fillRef>
-              <a:effectRef idx="0">
-                <a:schemeClr val="accent1"/>
-              </a:effectRef>
-              <a:fontRef idx="minor">
-                <a:schemeClr val="lt1"/>
-              </a:fontRef>
-            </p:style>
-            <p:txBody>
-              <a:bodyPr rtlCol="0" anchor="ctr"/>
-              <a:lstStyle/>
-              <a:p>
-                <a:pPr algn="ctr"/>
-                <a:r>
-                  <a:rPr lang="en-US" dirty="0">
-                    <a:cs typeface="Calibri"/>
-                  </a:rPr>
-                  <a:t>base</a:t>
-                </a:r>
-                <a:endParaRPr lang="en-US" dirty="0"/>
-              </a:p>
-            </p:txBody>
-          </p:sp>
-          <p:sp>
-            <p:nvSpPr>
-              <p:cNvPr id="7" name="Flowchart: Magnetic Disk 6">
-                <a:extLst>
-                  <a:ext uri="{FF2B5EF4-FFF2-40B4-BE49-F238E27FC236}">
-                    <a16:creationId xmlns:a16="http://schemas.microsoft.com/office/drawing/2014/main" id="{24C9E50D-40F1-495B-A231-22C651E02AC5}"/>
-                  </a:ext>
-                </a:extLst>
-              </p:cNvPr>
-              <p:cNvSpPr/>
-              <p:nvPr/>
-            </p:nvSpPr>
-            <p:spPr>
-              <a:xfrm>
-                <a:off x="2541605" y="2193203"/>
-                <a:ext cx="916912" cy="615461"/>
-              </a:xfrm>
-              <a:prstGeom prst="flowChartMagneticDisk">
-                <a:avLst/>
-              </a:prstGeom>
-            </p:spPr>
-            <p:style>
-              <a:lnRef idx="2">
-                <a:schemeClr val="accent1">
-                  <a:shade val="50000"/>
-                </a:schemeClr>
-              </a:lnRef>
-              <a:fillRef idx="1">
-                <a:schemeClr val="accent1"/>
-              </a:fillRef>
-              <a:effectRef idx="0">
-                <a:schemeClr val="accent1"/>
-              </a:effectRef>
-              <a:fontRef idx="minor">
-                <a:schemeClr val="lt1"/>
-              </a:fontRef>
-            </p:style>
-            <p:txBody>
-              <a:bodyPr rtlCol="0" anchor="ctr"/>
-              <a:lstStyle/>
-              <a:p>
-                <a:pPr algn="ctr"/>
-                <a:r>
-                  <a:rPr lang="en-US" dirty="0" err="1">
-                    <a:cs typeface="Calibri"/>
-                  </a:rPr>
-                  <a:t>devel</a:t>
-                </a:r>
-                <a:endParaRPr lang="en-US" dirty="0" err="1"/>
-              </a:p>
-            </p:txBody>
-          </p:sp>
-          <p:sp>
-            <p:nvSpPr>
-              <p:cNvPr id="8" name="Flowchart: Magnetic Disk 7">
-                <a:extLst>
-                  <a:ext uri="{FF2B5EF4-FFF2-40B4-BE49-F238E27FC236}">
-                    <a16:creationId xmlns:a16="http://schemas.microsoft.com/office/drawing/2014/main" id="{41EBCBF7-F9CC-4ECF-B131-B5A0EF94DF1B}"/>
-                  </a:ext>
-                </a:extLst>
-              </p:cNvPr>
-              <p:cNvSpPr/>
-              <p:nvPr/>
-            </p:nvSpPr>
-            <p:spPr>
-              <a:xfrm>
-                <a:off x="2541605" y="3059872"/>
-                <a:ext cx="916912" cy="615461"/>
-              </a:xfrm>
-              <a:prstGeom prst="flowChartMagneticDisk">
-                <a:avLst/>
-              </a:prstGeom>
-            </p:spPr>
-            <p:style>
-              <a:lnRef idx="2">
-                <a:schemeClr val="accent1">
-                  <a:shade val="50000"/>
-                </a:schemeClr>
-              </a:lnRef>
-              <a:fillRef idx="1">
-                <a:schemeClr val="accent1"/>
-              </a:fillRef>
-              <a:effectRef idx="0">
-                <a:schemeClr val="accent1"/>
-              </a:effectRef>
-              <a:fontRef idx="minor">
-                <a:schemeClr val="lt1"/>
-              </a:fontRef>
-            </p:style>
-            <p:txBody>
-              <a:bodyPr rtlCol="0" anchor="ctr"/>
-              <a:lstStyle/>
-              <a:p>
-                <a:pPr algn="ctr"/>
-                <a:r>
-                  <a:rPr lang="en-US" dirty="0">
-                    <a:cs typeface="Calibri"/>
-                  </a:rPr>
-                  <a:t>release</a:t>
-                </a:r>
-                <a:endParaRPr lang="en-US" dirty="0"/>
-              </a:p>
-            </p:txBody>
-          </p:sp>
-          <p:sp>
-            <p:nvSpPr>
-              <p:cNvPr id="12" name="Rectangle: Rounded Corners 11">
-                <a:extLst>
-                  <a:ext uri="{FF2B5EF4-FFF2-40B4-BE49-F238E27FC236}">
-                    <a16:creationId xmlns:a16="http://schemas.microsoft.com/office/drawing/2014/main" id="{71EC5FF7-5C56-4BD6-9EE2-3BBE90D87629}"/>
-                  </a:ext>
-                </a:extLst>
-              </p:cNvPr>
-              <p:cNvSpPr/>
-              <p:nvPr/>
-            </p:nvSpPr>
-            <p:spPr>
-              <a:xfrm>
-                <a:off x="2540035" y="3987625"/>
-                <a:ext cx="916912" cy="471017"/>
-              </a:xfrm>
-              <a:prstGeom prst="roundRect">
-                <a:avLst/>
-              </a:prstGeom>
-            </p:spPr>
-            <p:style>
-              <a:lnRef idx="2">
-                <a:schemeClr val="accent1">
-                  <a:shade val="50000"/>
-                </a:schemeClr>
-              </a:lnRef>
-              <a:fillRef idx="1">
-                <a:schemeClr val="accent1"/>
-              </a:fillRef>
-              <a:effectRef idx="0">
-                <a:schemeClr val="accent1"/>
-              </a:effectRef>
-              <a:fontRef idx="minor">
-                <a:schemeClr val="lt1"/>
-              </a:fontRef>
-            </p:style>
-            <p:txBody>
-              <a:bodyPr rtlCol="0" anchor="ctr"/>
-              <a:lstStyle/>
-              <a:p>
-                <a:pPr algn="ctr"/>
-                <a:r>
-                  <a:rPr lang="en-US" dirty="0">
-                    <a:cs typeface="Calibri"/>
-                  </a:rPr>
-                  <a:t>tar.gz</a:t>
-                </a:r>
-                <a:endParaRPr lang="en-US" dirty="0"/>
-              </a:p>
-            </p:txBody>
-          </p:sp>
-          <p:sp>
-            <p:nvSpPr>
-              <p:cNvPr id="2846" name="TextBox 2845">
-                <a:extLst>
-                  <a:ext uri="{FF2B5EF4-FFF2-40B4-BE49-F238E27FC236}">
-                    <a16:creationId xmlns:a16="http://schemas.microsoft.com/office/drawing/2014/main" id="{7509AF19-68DB-4611-8918-BFC63E56C8E1}"/>
-                  </a:ext>
-                </a:extLst>
-              </p:cNvPr>
-              <p:cNvSpPr txBox="1"/>
-              <p:nvPr/>
-            </p:nvSpPr>
-            <p:spPr>
-              <a:xfrm>
-                <a:off x="2267786" y="964641"/>
-                <a:ext cx="1493438" cy="253916"/>
-              </a:xfrm>
-              <a:prstGeom prst="rect">
-                <a:avLst/>
-              </a:prstGeom>
-              <a:noFill/>
-            </p:spPr>
-            <p:txBody>
-              <a:bodyPr rot="0" spcFirstLastPara="0" vertOverflow="overflow" horzOverflow="overflow" vert="horz" wrap="square" lIns="91440" tIns="45720" rIns="91440" bIns="45720" numCol="1" spcCol="0" rtlCol="0" fromWordArt="0" anchor="t" anchorCtr="0" forceAA="0" compatLnSpc="1">
-                <a:prstTxWarp prst="textNoShape">
-                  <a:avLst/>
-                </a:prstTxWarp>
-                <a:spAutoFit/>
-              </a:bodyPr>
-              <a:lstStyle/>
-              <a:p>
-                <a:pPr algn="ctr"/>
-                <a:r>
-                  <a:rPr lang="en-US" sz="1050" dirty="0">
-                    <a:solidFill>
-                      <a:schemeClr val="bg1"/>
-                    </a:solidFill>
-                    <a:ea typeface="+mn-lt"/>
-                    <a:cs typeface="+mn-lt"/>
-                  </a:rPr>
-                  <a:t>Registry (optional)</a:t>
-                </a:r>
-                <a:endParaRPr lang="en-US" sz="1050">
-                  <a:solidFill>
-                    <a:schemeClr val="bg1"/>
-                  </a:solidFill>
-                  <a:cs typeface="Calibri"/>
-                </a:endParaRPr>
-              </a:p>
-            </p:txBody>
-          </p:sp>
-        </p:grpSp>
-        <p:sp>
-          <p:nvSpPr>
-            <p:cNvPr id="3356" name="Rectangle: Rounded Corners 3355">
-              <a:extLst>
-                <a:ext uri="{FF2B5EF4-FFF2-40B4-BE49-F238E27FC236}">
-                  <a16:creationId xmlns:a16="http://schemas.microsoft.com/office/drawing/2014/main" id="{6DF4A37B-FA3F-4801-AD38-15B8945E3509}"/>
+                  <a16:creationId xmlns:a16="http://schemas.microsoft.com/office/drawing/2014/main" id="{24C9E50D-40F1-495B-A231-22C651E02AC5}"/>
                 </a:ext>
               </a:extLst>
             </p:cNvPr>
@@ -8191,10 +8168,10 @@
           </p:nvSpPr>
           <p:spPr>
             <a:xfrm>
-              <a:off x="7462157" y="3753687"/>
-              <a:ext cx="1149280" cy="483577"/>
+              <a:off x="2541605" y="2193203"/>
+              <a:ext cx="916912" cy="615461"/>
             </a:xfrm>
-            <a:prstGeom prst="roundRect">
+            <a:prstGeom prst="flowChartMagneticDisk">
               <a:avLst/>
             </a:prstGeom>
           </p:spPr>
@@ -8220,23 +8197,21 @@
             <a:p>
               <a:pPr algn="ctr"/>
               <a:r>
-                <a:rPr lang="en-US" sz="1400" dirty="0">
+                <a:rPr lang="en-US" dirty="0" err="1">
                   <a:cs typeface="Calibri"/>
                 </a:rPr>
-                <a:t>Editor, IDE</a:t>
+                <a:t>devel</a:t>
               </a:r>
-              <a:endParaRPr lang="en-US" sz="1600" dirty="0">
-                <a:cs typeface="Calibri"/>
-              </a:endParaRPr>
+              <a:endParaRPr lang="en-US" dirty="0" err="1"/>
             </a:p>
           </p:txBody>
         </p:sp>
         <p:sp>
           <p:nvSpPr>
-            <p:cNvPr id="3359" name="Arrow: Left 3358">
+            <p:cNvPr id="8" name="Flowchart: Magnetic Disk 7">
               <a:extLst>
                 <a:ext uri="{FF2B5EF4-FFF2-40B4-BE49-F238E27FC236}">
-                  <a16:creationId xmlns:a16="http://schemas.microsoft.com/office/drawing/2014/main" id="{BD563D21-0171-434B-8677-E8600FE8C2DC}"/>
+                  <a16:creationId xmlns:a16="http://schemas.microsoft.com/office/drawing/2014/main" id="{41EBCBF7-F9CC-4ECF-B131-B5A0EF94DF1B}"/>
                 </a:ext>
               </a:extLst>
             </p:cNvPr>
@@ -8244,11 +8219,11 @@
             <p:nvPr/>
           </p:nvSpPr>
           <p:spPr>
-            <a:xfrm rot="5400000">
-              <a:off x="7623269" y="3106611"/>
-              <a:ext cx="734786" cy="408214"/>
+            <a:xfrm>
+              <a:off x="2541605" y="3059872"/>
+              <a:ext cx="916912" cy="615461"/>
             </a:xfrm>
-            <a:prstGeom prst="leftArrow">
+            <a:prstGeom prst="flowChartMagneticDisk">
               <a:avLst/>
             </a:prstGeom>
           </p:spPr>
@@ -8269,80 +8244,406 @@
             </a:fontRef>
           </p:style>
           <p:txBody>
-            <a:bodyPr rtlCol="0" anchor="ctr"/>
+            <a:bodyPr lIns="91440" tIns="45720" rIns="91440" bIns="45720" rtlCol="0" anchor="ctr"/>
             <a:lstStyle/>
             <a:p>
               <a:pPr algn="ctr"/>
               <a:r>
-                <a:rPr lang="en-US" sz="1200" dirty="0">
+                <a:rPr lang="en-US" dirty="0">
                   <a:cs typeface="Calibri"/>
                 </a:rPr>
-                <a:t>modify</a:t>
+                <a:t>frozen</a:t>
               </a:r>
-              <a:endParaRPr lang="en-US">
-                <a:cs typeface="Calibri"/>
-              </a:endParaRPr>
+              <a:endParaRPr lang="en-US" dirty="0"/>
             </a:p>
           </p:txBody>
         </p:sp>
         <p:sp>
           <p:nvSpPr>
-            <p:cNvPr id="30" name="Arrow: Left 29">
+            <p:cNvPr id="2846" name="TextBox 2845">
               <a:extLst>
                 <a:ext uri="{FF2B5EF4-FFF2-40B4-BE49-F238E27FC236}">
-                  <a16:creationId xmlns:a16="http://schemas.microsoft.com/office/drawing/2014/main" id="{431218BD-66B8-4B9F-9D4F-17ABA1A52BCE}"/>
+                  <a16:creationId xmlns:a16="http://schemas.microsoft.com/office/drawing/2014/main" id="{7509AF19-68DB-4611-8918-BFC63E56C8E1}"/>
                 </a:ext>
               </a:extLst>
             </p:cNvPr>
-            <p:cNvSpPr/>
+            <p:cNvSpPr txBox="1"/>
             <p:nvPr/>
           </p:nvSpPr>
           <p:spPr>
-            <a:xfrm rot="21120000">
-              <a:off x="3754113" y="2974404"/>
-              <a:ext cx="3629964" cy="477296"/>
+            <a:xfrm>
+              <a:off x="2267786" y="964641"/>
+              <a:ext cx="1493438" cy="253916"/>
             </a:xfrm>
-            <a:prstGeom prst="leftArrow">
+            <a:prstGeom prst="rect">
               <a:avLst/>
             </a:prstGeom>
-            <a:solidFill>
-              <a:srgbClr val="92D050"/>
-            </a:solidFill>
+            <a:noFill/>
           </p:spPr>
-          <p:style>
-            <a:lnRef idx="2">
-              <a:schemeClr val="accent1">
-                <a:shade val="50000"/>
-              </a:schemeClr>
-            </a:lnRef>
-            <a:fillRef idx="1">
-              <a:schemeClr val="accent1"/>
-            </a:fillRef>
-            <a:effectRef idx="0">
-              <a:schemeClr val="accent1"/>
-            </a:effectRef>
-            <a:fontRef idx="minor">
-              <a:schemeClr val="lt1"/>
-            </a:fontRef>
-          </p:style>
           <p:txBody>
-            <a:bodyPr rtlCol="0" anchor="ctr"/>
+            <a:bodyPr rot="0" spcFirstLastPara="0" vertOverflow="overflow" horzOverflow="overflow" vert="horz" wrap="square" lIns="91440" tIns="45720" rIns="91440" bIns="45720" numCol="1" spcCol="0" rtlCol="0" fromWordArt="0" anchor="t" anchorCtr="0" forceAA="0" compatLnSpc="1">
+              <a:prstTxWarp prst="textNoShape">
+                <a:avLst/>
+              </a:prstTxWarp>
+              <a:spAutoFit/>
+            </a:bodyPr>
             <a:lstStyle/>
             <a:p>
               <a:pPr algn="ctr"/>
               <a:r>
-                <a:rPr lang="en-US" sz="1100" dirty="0">
-                  <a:cs typeface="Calibri"/>
+                <a:rPr lang="en-US" sz="1050" dirty="0">
+                  <a:solidFill>
+                    <a:schemeClr val="bg1"/>
+                  </a:solidFill>
+                  <a:ea typeface="+mn-lt"/>
+                  <a:cs typeface="+mn-lt"/>
                 </a:rPr>
-                <a:t>copied</a:t>
+                <a:t>Registry (optional)</a:t>
               </a:r>
-              <a:endParaRPr lang="en-US" sz="1400" dirty="0">
+              <a:endParaRPr lang="en-US" sz="1050">
+                <a:solidFill>
+                  <a:schemeClr val="bg1"/>
+                </a:solidFill>
                 <a:cs typeface="Calibri"/>
               </a:endParaRPr>
             </a:p>
           </p:txBody>
         </p:sp>
       </p:grpSp>
+      <p:sp>
+        <p:nvSpPr>
+          <p:cNvPr id="3356" name="Rectangle: Rounded Corners 3355">
+            <a:extLst>
+              <a:ext uri="{FF2B5EF4-FFF2-40B4-BE49-F238E27FC236}">
+                <a16:creationId xmlns:a16="http://schemas.microsoft.com/office/drawing/2014/main" id="{6DF4A37B-FA3F-4801-AD38-15B8945E3509}"/>
+              </a:ext>
+            </a:extLst>
+          </p:cNvPr>
+          <p:cNvSpPr/>
+          <p:nvPr/>
+        </p:nvSpPr>
+        <p:spPr>
+          <a:xfrm>
+            <a:off x="7487005" y="3549320"/>
+            <a:ext cx="1149280" cy="585763"/>
+          </a:xfrm>
+          <a:prstGeom prst="roundRect">
+            <a:avLst/>
+          </a:prstGeom>
+        </p:spPr>
+        <p:style>
+          <a:lnRef idx="2">
+            <a:schemeClr val="accent1">
+              <a:shade val="50000"/>
+            </a:schemeClr>
+          </a:lnRef>
+          <a:fillRef idx="1">
+            <a:schemeClr val="accent1"/>
+          </a:fillRef>
+          <a:effectRef idx="0">
+            <a:schemeClr val="accent1"/>
+          </a:effectRef>
+          <a:fontRef idx="minor">
+            <a:schemeClr val="lt1"/>
+          </a:fontRef>
+        </p:style>
+        <p:txBody>
+          <a:bodyPr rtlCol="0" anchor="ctr"/>
+          <a:lstStyle/>
+          <a:p>
+            <a:pPr algn="ctr"/>
+            <a:r>
+              <a:rPr lang="en-US" sz="1400" dirty="0">
+                <a:cs typeface="Calibri"/>
+              </a:rPr>
+              <a:t>Editor, IDE</a:t>
+            </a:r>
+            <a:endParaRPr lang="en-US" sz="1600" dirty="0">
+              <a:cs typeface="Calibri"/>
+            </a:endParaRPr>
+          </a:p>
+        </p:txBody>
+      </p:sp>
+      <p:sp>
+        <p:nvSpPr>
+          <p:cNvPr id="3359" name="Arrow: Left 3358">
+            <a:extLst>
+              <a:ext uri="{FF2B5EF4-FFF2-40B4-BE49-F238E27FC236}">
+                <a16:creationId xmlns:a16="http://schemas.microsoft.com/office/drawing/2014/main" id="{BD563D21-0171-434B-8677-E8600FE8C2DC}"/>
+              </a:ext>
+            </a:extLst>
+          </p:cNvPr>
+          <p:cNvSpPr/>
+          <p:nvPr/>
+        </p:nvSpPr>
+        <p:spPr>
+          <a:xfrm rot="5400000">
+            <a:off x="7570482" y="2684400"/>
+            <a:ext cx="890056" cy="408214"/>
+          </a:xfrm>
+          <a:prstGeom prst="leftArrow">
+            <a:avLst/>
+          </a:prstGeom>
+        </p:spPr>
+        <p:style>
+          <a:lnRef idx="2">
+            <a:schemeClr val="accent1">
+              <a:shade val="50000"/>
+            </a:schemeClr>
+          </a:lnRef>
+          <a:fillRef idx="1">
+            <a:schemeClr val="accent1"/>
+          </a:fillRef>
+          <a:effectRef idx="0">
+            <a:schemeClr val="accent1"/>
+          </a:effectRef>
+          <a:fontRef idx="minor">
+            <a:schemeClr val="lt1"/>
+          </a:fontRef>
+        </p:style>
+        <p:txBody>
+          <a:bodyPr rtlCol="0" anchor="ctr"/>
+          <a:lstStyle/>
+          <a:p>
+            <a:pPr algn="ctr"/>
+            <a:r>
+              <a:rPr lang="en-US" sz="1200" dirty="0">
+                <a:cs typeface="Calibri"/>
+              </a:rPr>
+              <a:t>modify</a:t>
+            </a:r>
+            <a:endParaRPr lang="en-US">
+              <a:cs typeface="Calibri"/>
+            </a:endParaRPr>
+          </a:p>
+        </p:txBody>
+      </p:sp>
+      <p:sp>
+        <p:nvSpPr>
+          <p:cNvPr id="30" name="Arrow: Left 29">
+            <a:extLst>
+              <a:ext uri="{FF2B5EF4-FFF2-40B4-BE49-F238E27FC236}">
+                <a16:creationId xmlns:a16="http://schemas.microsoft.com/office/drawing/2014/main" id="{431218BD-66B8-4B9F-9D4F-17ABA1A52BCE}"/>
+              </a:ext>
+            </a:extLst>
+          </p:cNvPr>
+          <p:cNvSpPr/>
+          <p:nvPr/>
+        </p:nvSpPr>
+        <p:spPr>
+          <a:xfrm rot="20880000">
+            <a:off x="3773520" y="2438935"/>
+            <a:ext cx="3605117" cy="619568"/>
+          </a:xfrm>
+          <a:prstGeom prst="leftArrow">
+            <a:avLst/>
+          </a:prstGeom>
+          <a:solidFill>
+            <a:srgbClr val="92D050"/>
+          </a:solidFill>
+        </p:spPr>
+        <p:style>
+          <a:lnRef idx="2">
+            <a:schemeClr val="accent1">
+              <a:shade val="50000"/>
+            </a:schemeClr>
+          </a:lnRef>
+          <a:fillRef idx="1">
+            <a:schemeClr val="accent1"/>
+          </a:fillRef>
+          <a:effectRef idx="0">
+            <a:schemeClr val="accent1"/>
+          </a:effectRef>
+          <a:fontRef idx="minor">
+            <a:schemeClr val="lt1"/>
+          </a:fontRef>
+        </p:style>
+        <p:txBody>
+          <a:bodyPr rtlCol="0" anchor="ctr"/>
+          <a:lstStyle/>
+          <a:p>
+            <a:pPr algn="ctr"/>
+            <a:r>
+              <a:rPr lang="en-US" sz="1100" dirty="0">
+                <a:cs typeface="Calibri"/>
+              </a:rPr>
+              <a:t>copied</a:t>
+            </a:r>
+            <a:endParaRPr lang="en-US" sz="1400" dirty="0">
+              <a:cs typeface="Calibri"/>
+            </a:endParaRPr>
+          </a:p>
+        </p:txBody>
+      </p:sp>
+      <p:sp>
+        <p:nvSpPr>
+          <p:cNvPr id="3573" name="Flowchart: Magnetic Disk 7">
+            <a:extLst>
+              <a:ext uri="{FF2B5EF4-FFF2-40B4-BE49-F238E27FC236}">
+                <a16:creationId xmlns:a16="http://schemas.microsoft.com/office/drawing/2014/main" id="{AE6B324F-2B1A-A9EC-66C8-3A857314E05D}"/>
+              </a:ext>
+            </a:extLst>
+          </p:cNvPr>
+          <p:cNvSpPr/>
+          <p:nvPr/>
+        </p:nvSpPr>
+        <p:spPr>
+          <a:xfrm>
+            <a:off x="2806685" y="3857410"/>
+            <a:ext cx="916912" cy="745516"/>
+          </a:xfrm>
+          <a:prstGeom prst="flowChartMagneticDisk">
+            <a:avLst/>
+          </a:prstGeom>
+        </p:spPr>
+        <p:style>
+          <a:lnRef idx="2">
+            <a:schemeClr val="accent1">
+              <a:shade val="50000"/>
+            </a:schemeClr>
+          </a:lnRef>
+          <a:fillRef idx="1">
+            <a:schemeClr val="accent1"/>
+          </a:fillRef>
+          <a:effectRef idx="0">
+            <a:schemeClr val="accent1"/>
+          </a:effectRef>
+          <a:fontRef idx="minor">
+            <a:schemeClr val="lt1"/>
+          </a:fontRef>
+        </p:style>
+        <p:txBody>
+          <a:bodyPr lIns="91440" tIns="45720" rIns="91440" bIns="45720" rtlCol="0" anchor="ctr"/>
+          <a:lstStyle/>
+          <a:p>
+            <a:pPr algn="ctr"/>
+            <a:r>
+              <a:rPr lang="en-US" dirty="0">
+                <a:cs typeface="Calibri"/>
+              </a:rPr>
+              <a:t>release</a:t>
+            </a:r>
+            <a:endParaRPr lang="de-DE" dirty="0"/>
+          </a:p>
+        </p:txBody>
+      </p:sp>
+      <p:sp>
+        <p:nvSpPr>
+          <p:cNvPr id="3593" name="Flowchart: Magnetic Disk 22">
+            <a:extLst>
+              <a:ext uri="{FF2B5EF4-FFF2-40B4-BE49-F238E27FC236}">
+                <a16:creationId xmlns:a16="http://schemas.microsoft.com/office/drawing/2014/main" id="{6E7C0A3C-2731-D484-007D-6CCB547835CC}"/>
+              </a:ext>
+            </a:extLst>
+          </p:cNvPr>
+          <p:cNvSpPr/>
+          <p:nvPr/>
+        </p:nvSpPr>
+        <p:spPr>
+          <a:xfrm>
+            <a:off x="4211870" y="3884746"/>
+            <a:ext cx="2147835" cy="1103062"/>
+          </a:xfrm>
+          <a:prstGeom prst="flowChartMagneticDisk">
+            <a:avLst/>
+          </a:prstGeom>
+        </p:spPr>
+        <p:style>
+          <a:lnRef idx="2">
+            <a:schemeClr val="accent1">
+              <a:shade val="50000"/>
+            </a:schemeClr>
+          </a:lnRef>
+          <a:fillRef idx="1">
+            <a:schemeClr val="accent1"/>
+          </a:fillRef>
+          <a:effectRef idx="0">
+            <a:schemeClr val="accent1"/>
+          </a:effectRef>
+          <a:fontRef idx="minor">
+            <a:schemeClr val="lt1"/>
+          </a:fontRef>
+        </p:style>
+        <p:txBody>
+          <a:bodyPr lIns="91440" tIns="45720" rIns="91440" bIns="45720" rtlCol="0" anchor="ctr"/>
+          <a:lstStyle/>
+          <a:p>
+            <a:r>
+              <a:rPr lang="en-US" sz="1200" dirty="0">
+                <a:cs typeface="Calibri"/>
+              </a:rPr>
+              <a:t>release</a:t>
+            </a:r>
+            <a:br>
+              <a:rPr lang="en-US" sz="1200" dirty="0">
+                <a:cs typeface="Calibri"/>
+              </a:rPr>
+            </a:br>
+            <a:r>
+              <a:rPr lang="en-US" sz="1200" dirty="0">
+                <a:cs typeface="Calibri"/>
+              </a:rPr>
+              <a:t>container</a:t>
+            </a:r>
+            <a:endParaRPr lang="de-DE" dirty="0">
+              <a:ea typeface="Calibri"/>
+              <a:cs typeface="Calibri"/>
+            </a:endParaRPr>
+          </a:p>
+        </p:txBody>
+      </p:sp>
+      <p:sp>
+        <p:nvSpPr>
+          <p:cNvPr id="3594" name="Flowchart: Multidocument 23">
+            <a:extLst>
+              <a:ext uri="{FF2B5EF4-FFF2-40B4-BE49-F238E27FC236}">
+                <a16:creationId xmlns:a16="http://schemas.microsoft.com/office/drawing/2014/main" id="{2926091D-0121-D552-E254-EF9DBBFFC5EB}"/>
+              </a:ext>
+            </a:extLst>
+          </p:cNvPr>
+          <p:cNvSpPr/>
+          <p:nvPr/>
+        </p:nvSpPr>
+        <p:spPr>
+          <a:xfrm>
+            <a:off x="4958286" y="4316563"/>
+            <a:ext cx="1274885" cy="593370"/>
+          </a:xfrm>
+          <a:prstGeom prst="flowChartMultidocument">
+            <a:avLst/>
+          </a:prstGeom>
+        </p:spPr>
+        <p:style>
+          <a:lnRef idx="2">
+            <a:schemeClr val="accent1">
+              <a:shade val="50000"/>
+            </a:schemeClr>
+          </a:lnRef>
+          <a:fillRef idx="1">
+            <a:schemeClr val="accent1"/>
+          </a:fillRef>
+          <a:effectRef idx="0">
+            <a:schemeClr val="accent1"/>
+          </a:effectRef>
+          <a:fontRef idx="minor">
+            <a:schemeClr val="lt1"/>
+          </a:fontRef>
+        </p:style>
+        <p:txBody>
+          <a:bodyPr lIns="91440" tIns="45720" rIns="91440" bIns="45720" rtlCol="0" anchor="ctr"/>
+          <a:lstStyle/>
+          <a:p>
+            <a:pPr algn="ctr"/>
+            <a:r>
+              <a:rPr lang="en-US" sz="900" dirty="0">
+                <a:cs typeface="Calibri"/>
+              </a:rPr>
+              <a:t>Binary, plugins, config</a:t>
+            </a:r>
+            <a:endParaRPr lang="de-DE" dirty="0"/>
+          </a:p>
+        </p:txBody>
+      </p:sp>
     </p:spTree>
     <p:extLst>
       <p:ext uri="{BB962C8B-B14F-4D97-AF65-F5344CB8AC3E}">
@@ -8903,18 +9204,18 @@
 </file>
 
 <file path=customXml/item1.xml><?xml version="1.0" encoding="utf-8"?>
-<p:properties xmlns:p="http://schemas.microsoft.com/office/2006/metadata/properties" xmlns:xsi="http://www.w3.org/2001/XMLSchema-instance" xmlns:pc="http://schemas.microsoft.com/office/infopath/2007/PartnerControls">
-  <documentManagement/>
-</p:properties>
-</file>
-
-<file path=customXml/item2.xml><?xml version="1.0" encoding="utf-8"?>
 <?mso-contentType ?>
 <FormTemplates xmlns="http://schemas.microsoft.com/sharepoint/v3/contenttype/forms">
   <Display>DocumentLibraryForm</Display>
   <Edit>DocumentLibraryForm</Edit>
   <New>DocumentLibraryForm</New>
 </FormTemplates>
+</file>
+
+<file path=customXml/item2.xml><?xml version="1.0" encoding="utf-8"?>
+<p:properties xmlns:p="http://schemas.microsoft.com/office/2006/metadata/properties" xmlns:xsi="http://www.w3.org/2001/XMLSchema-instance" xmlns:pc="http://schemas.microsoft.com/office/infopath/2007/PartnerControls">
+  <documentManagement/>
+</p:properties>
 </file>
 
 <file path=customXml/item3.xml><?xml version="1.0" encoding="utf-8"?>
@@ -9050,18 +9351,18 @@
 </file>
 
 <file path=customXml/itemProps1.xml><?xml version="1.0" encoding="utf-8"?>
-<ds:datastoreItem xmlns:ds="http://schemas.openxmlformats.org/officeDocument/2006/customXml" ds:itemID="{7C89712E-30F6-490B-9EE1-F9F39BA8356F}">
+<ds:datastoreItem xmlns:ds="http://schemas.openxmlformats.org/officeDocument/2006/customXml" ds:itemID="{350DFF89-922A-4754-A66B-49E694ACFAE6}">
   <ds:schemaRefs>
-    <ds:schemaRef ds:uri="http://schemas.microsoft.com/office/2006/metadata/properties"/>
-    <ds:schemaRef ds:uri="http://schemas.microsoft.com/office/infopath/2007/PartnerControls"/>
+    <ds:schemaRef ds:uri="http://schemas.microsoft.com/sharepoint/v3/contenttype/forms"/>
   </ds:schemaRefs>
 </ds:datastoreItem>
 </file>
 
 <file path=customXml/itemProps2.xml><?xml version="1.0" encoding="utf-8"?>
-<ds:datastoreItem xmlns:ds="http://schemas.openxmlformats.org/officeDocument/2006/customXml" ds:itemID="{350DFF89-922A-4754-A66B-49E694ACFAE6}">
+<ds:datastoreItem xmlns:ds="http://schemas.openxmlformats.org/officeDocument/2006/customXml" ds:itemID="{7C89712E-30F6-490B-9EE1-F9F39BA8356F}">
   <ds:schemaRefs>
-    <ds:schemaRef ds:uri="http://schemas.microsoft.com/sharepoint/v3/contenttype/forms"/>
+    <ds:schemaRef ds:uri="http://schemas.microsoft.com/office/2006/metadata/properties"/>
+    <ds:schemaRef ds:uri="http://schemas.microsoft.com/office/infopath/2007/PartnerControls"/>
   </ds:schemaRefs>
 </ds:datastoreItem>
 </file>

</xml_diff>